<commit_message>
Intro nearly done, ready for discussion.Methods and Results cleaning now
</commit_message>
<xml_diff>
--- a/Poster/GR diagram.pptx
+++ b/Poster/GR diagram.pptx
@@ -125,12 +125,12 @@
   <pc:docChgLst>
     <pc:chgData name="Sean White" userId="aeee6c57aadbdcf3" providerId="LiveId" clId="{227B85E9-83B7-4100-B9A3-CE34D7F7F11E}"/>
     <pc:docChg chg="custSel modSld">
-      <pc:chgData name="Sean White" userId="aeee6c57aadbdcf3" providerId="LiveId" clId="{227B85E9-83B7-4100-B9A3-CE34D7F7F11E}" dt="2025-01-27T19:42:02.834" v="126" actId="108"/>
+      <pc:chgData name="Sean White" userId="aeee6c57aadbdcf3" providerId="LiveId" clId="{227B85E9-83B7-4100-B9A3-CE34D7F7F11E}" dt="2025-04-09T15:52:40.794" v="129" actId="14100"/>
       <pc:docMkLst>
         <pc:docMk/>
       </pc:docMkLst>
       <pc:sldChg chg="delSp modSp mod">
-        <pc:chgData name="Sean White" userId="aeee6c57aadbdcf3" providerId="LiveId" clId="{227B85E9-83B7-4100-B9A3-CE34D7F7F11E}" dt="2025-01-27T19:42:02.834" v="126" actId="108"/>
+        <pc:chgData name="Sean White" userId="aeee6c57aadbdcf3" providerId="LiveId" clId="{227B85E9-83B7-4100-B9A3-CE34D7F7F11E}" dt="2025-04-09T15:52:40.794" v="129" actId="14100"/>
         <pc:sldMkLst>
           <pc:docMk/>
           <pc:sldMk cId="2469039605" sldId="256"/>
@@ -157,22 +157,6 @@
             <pc:docMk/>
             <pc:sldMk cId="2469039605" sldId="256"/>
             <ac:spMk id="6" creationId="{C58557E8-AE07-E90D-4FF1-BFE8138053BD}"/>
-          </ac:spMkLst>
-        </pc:spChg>
-        <pc:spChg chg="del topLvl">
-          <ac:chgData name="Sean White" userId="aeee6c57aadbdcf3" providerId="LiveId" clId="{227B85E9-83B7-4100-B9A3-CE34D7F7F11E}" dt="2025-01-27T19:35:57.630" v="4" actId="478"/>
-          <ac:spMkLst>
-            <pc:docMk/>
-            <pc:sldMk cId="2469039605" sldId="256"/>
-            <ac:spMk id="10" creationId="{473B490E-3ABD-EAD7-C3D3-B964C82059A0}"/>
-          </ac:spMkLst>
-        </pc:spChg>
-        <pc:spChg chg="del">
-          <ac:chgData name="Sean White" userId="aeee6c57aadbdcf3" providerId="LiveId" clId="{227B85E9-83B7-4100-B9A3-CE34D7F7F11E}" dt="2025-01-27T19:35:48.445" v="1" actId="478"/>
-          <ac:spMkLst>
-            <pc:docMk/>
-            <pc:sldMk cId="2469039605" sldId="256"/>
-            <ac:spMk id="11" creationId="{95A34C7C-EB43-0572-BF1D-43F9A0F7DA6B}"/>
           </ac:spMkLst>
         </pc:spChg>
         <pc:spChg chg="mod">
@@ -223,22 +207,6 @@
             <ac:spMk id="35" creationId="{3254255B-259F-1A9E-F0B4-F6D1B4D71B47}"/>
           </ac:spMkLst>
         </pc:spChg>
-        <pc:spChg chg="del">
-          <ac:chgData name="Sean White" userId="aeee6c57aadbdcf3" providerId="LiveId" clId="{227B85E9-83B7-4100-B9A3-CE34D7F7F11E}" dt="2025-01-27T19:36:00.044" v="5" actId="478"/>
-          <ac:spMkLst>
-            <pc:docMk/>
-            <pc:sldMk cId="2469039605" sldId="256"/>
-            <ac:spMk id="48" creationId="{BF9ECCA5-47E0-164D-2662-E278AF0A722E}"/>
-          </ac:spMkLst>
-        </pc:spChg>
-        <pc:spChg chg="del">
-          <ac:chgData name="Sean White" userId="aeee6c57aadbdcf3" providerId="LiveId" clId="{227B85E9-83B7-4100-B9A3-CE34D7F7F11E}" dt="2025-01-27T19:35:50.473" v="2" actId="478"/>
-          <ac:spMkLst>
-            <pc:docMk/>
-            <pc:sldMk cId="2469039605" sldId="256"/>
-            <ac:spMk id="49" creationId="{3FE223ED-27A2-75C8-B18B-5D46E43C2BBB}"/>
-          </ac:spMkLst>
-        </pc:spChg>
         <pc:spChg chg="mod">
           <ac:chgData name="Sean White" userId="aeee6c57aadbdcf3" providerId="LiveId" clId="{227B85E9-83B7-4100-B9A3-CE34D7F7F11E}" dt="2025-01-27T19:39:07.209" v="68" actId="20577"/>
           <ac:spMkLst>
@@ -255,24 +223,24 @@
             <ac:spMk id="64" creationId="{7F147F7A-8614-670F-2C82-D9D0F2E238D1}"/>
           </ac:spMkLst>
         </pc:spChg>
-        <pc:spChg chg="mod">
-          <ac:chgData name="Sean White" userId="aeee6c57aadbdcf3" providerId="LiveId" clId="{227B85E9-83B7-4100-B9A3-CE34D7F7F11E}" dt="2025-01-27T19:42:02.834" v="126" actId="108"/>
+        <pc:spChg chg="del mod topLvl">
+          <ac:chgData name="Sean White" userId="aeee6c57aadbdcf3" providerId="LiveId" clId="{227B85E9-83B7-4100-B9A3-CE34D7F7F11E}" dt="2025-04-09T15:52:35.124" v="128" actId="478"/>
           <ac:spMkLst>
             <pc:docMk/>
             <pc:sldMk cId="2469039605" sldId="256"/>
             <ac:spMk id="69" creationId="{2410340F-2145-3D8D-0FD6-79751048E90F}"/>
           </ac:spMkLst>
         </pc:spChg>
-        <pc:grpChg chg="del">
-          <ac:chgData name="Sean White" userId="aeee6c57aadbdcf3" providerId="LiveId" clId="{227B85E9-83B7-4100-B9A3-CE34D7F7F11E}" dt="2025-01-27T19:35:57.630" v="4" actId="478"/>
+        <pc:grpChg chg="mod topLvl">
+          <ac:chgData name="Sean White" userId="aeee6c57aadbdcf3" providerId="LiveId" clId="{227B85E9-83B7-4100-B9A3-CE34D7F7F11E}" dt="2025-04-09T15:52:40.794" v="129" actId="14100"/>
           <ac:grpSpMkLst>
             <pc:docMk/>
             <pc:sldMk cId="2469039605" sldId="256"/>
-            <ac:grpSpMk id="23" creationId="{F254D256-6E57-7A37-2188-5FC5854BE434}"/>
+            <ac:grpSpMk id="65" creationId="{3E5AEAE9-1421-3AEF-FB68-7016EE66571E}"/>
           </ac:grpSpMkLst>
         </pc:grpChg>
-        <pc:grpChg chg="topLvl">
-          <ac:chgData name="Sean White" userId="aeee6c57aadbdcf3" providerId="LiveId" clId="{227B85E9-83B7-4100-B9A3-CE34D7F7F11E}" dt="2025-01-27T19:35:57.630" v="4" actId="478"/>
+        <pc:grpChg chg="del mod topLvl">
+          <ac:chgData name="Sean White" userId="aeee6c57aadbdcf3" providerId="LiveId" clId="{227B85E9-83B7-4100-B9A3-CE34D7F7F11E}" dt="2025-04-09T15:52:35.124" v="128" actId="478"/>
           <ac:grpSpMkLst>
             <pc:docMk/>
             <pc:sldMk cId="2469039605" sldId="256"/>
@@ -285,22 +253,6 @@
             <pc:docMk/>
             <pc:sldMk cId="2469039605" sldId="256"/>
             <ac:cxnSpMk id="28" creationId="{2080E814-9D4D-0EC5-5742-6E2C29099F44}"/>
-          </ac:cxnSpMkLst>
-        </pc:cxnChg>
-        <pc:cxnChg chg="del">
-          <ac:chgData name="Sean White" userId="aeee6c57aadbdcf3" providerId="LiveId" clId="{227B85E9-83B7-4100-B9A3-CE34D7F7F11E}" dt="2025-01-27T19:35:43.193" v="0" actId="478"/>
-          <ac:cxnSpMkLst>
-            <pc:docMk/>
-            <pc:sldMk cId="2469039605" sldId="256"/>
-            <ac:cxnSpMk id="39" creationId="{7B9567D9-F294-1CBA-74B3-6C700ADAE2FF}"/>
-          </ac:cxnSpMkLst>
-        </pc:cxnChg>
-        <pc:cxnChg chg="del mod">
-          <ac:chgData name="Sean White" userId="aeee6c57aadbdcf3" providerId="LiveId" clId="{227B85E9-83B7-4100-B9A3-CE34D7F7F11E}" dt="2025-01-27T19:35:54.223" v="3" actId="478"/>
-          <ac:cxnSpMkLst>
-            <pc:docMk/>
-            <pc:sldMk cId="2469039605" sldId="256"/>
-            <ac:cxnSpMk id="44" creationId="{2085F3C3-D635-D696-28C7-7FA990B9F270}"/>
           </ac:cxnSpMkLst>
         </pc:cxnChg>
       </pc:sldChg>
@@ -458,7 +410,7 @@
           <a:p>
             <a:fld id="{0D2FAE0B-8C89-473C-9622-2CC9A4826BE4}" type="datetimeFigureOut">
               <a:rPr lang="en-IE" smtClean="0"/>
-              <a:t>27/01/2025</a:t>
+              <a:t>09/04/2025</a:t>
             </a:fld>
             <a:endParaRPr lang="en-IE"/>
           </a:p>
@@ -658,7 +610,7 @@
           <a:p>
             <a:fld id="{0D2FAE0B-8C89-473C-9622-2CC9A4826BE4}" type="datetimeFigureOut">
               <a:rPr lang="en-IE" smtClean="0"/>
-              <a:t>27/01/2025</a:t>
+              <a:t>09/04/2025</a:t>
             </a:fld>
             <a:endParaRPr lang="en-IE"/>
           </a:p>
@@ -868,7 +820,7 @@
           <a:p>
             <a:fld id="{0D2FAE0B-8C89-473C-9622-2CC9A4826BE4}" type="datetimeFigureOut">
               <a:rPr lang="en-IE" smtClean="0"/>
-              <a:t>27/01/2025</a:t>
+              <a:t>09/04/2025</a:t>
             </a:fld>
             <a:endParaRPr lang="en-IE"/>
           </a:p>
@@ -1068,7 +1020,7 @@
           <a:p>
             <a:fld id="{0D2FAE0B-8C89-473C-9622-2CC9A4826BE4}" type="datetimeFigureOut">
               <a:rPr lang="en-IE" smtClean="0"/>
-              <a:t>27/01/2025</a:t>
+              <a:t>09/04/2025</a:t>
             </a:fld>
             <a:endParaRPr lang="en-IE"/>
           </a:p>
@@ -1344,7 +1296,7 @@
           <a:p>
             <a:fld id="{0D2FAE0B-8C89-473C-9622-2CC9A4826BE4}" type="datetimeFigureOut">
               <a:rPr lang="en-IE" smtClean="0"/>
-              <a:t>27/01/2025</a:t>
+              <a:t>09/04/2025</a:t>
             </a:fld>
             <a:endParaRPr lang="en-IE"/>
           </a:p>
@@ -1612,7 +1564,7 @@
           <a:p>
             <a:fld id="{0D2FAE0B-8C89-473C-9622-2CC9A4826BE4}" type="datetimeFigureOut">
               <a:rPr lang="en-IE" smtClean="0"/>
-              <a:t>27/01/2025</a:t>
+              <a:t>09/04/2025</a:t>
             </a:fld>
             <a:endParaRPr lang="en-IE"/>
           </a:p>
@@ -2027,7 +1979,7 @@
           <a:p>
             <a:fld id="{0D2FAE0B-8C89-473C-9622-2CC9A4826BE4}" type="datetimeFigureOut">
               <a:rPr lang="en-IE" smtClean="0"/>
-              <a:t>27/01/2025</a:t>
+              <a:t>09/04/2025</a:t>
             </a:fld>
             <a:endParaRPr lang="en-IE"/>
           </a:p>
@@ -2169,7 +2121,7 @@
           <a:p>
             <a:fld id="{0D2FAE0B-8C89-473C-9622-2CC9A4826BE4}" type="datetimeFigureOut">
               <a:rPr lang="en-IE" smtClean="0"/>
-              <a:t>27/01/2025</a:t>
+              <a:t>09/04/2025</a:t>
             </a:fld>
             <a:endParaRPr lang="en-IE"/>
           </a:p>
@@ -2282,7 +2234,7 @@
           <a:p>
             <a:fld id="{0D2FAE0B-8C89-473C-9622-2CC9A4826BE4}" type="datetimeFigureOut">
               <a:rPr lang="en-IE" smtClean="0"/>
-              <a:t>27/01/2025</a:t>
+              <a:t>09/04/2025</a:t>
             </a:fld>
             <a:endParaRPr lang="en-IE"/>
           </a:p>
@@ -2595,7 +2547,7 @@
           <a:p>
             <a:fld id="{0D2FAE0B-8C89-473C-9622-2CC9A4826BE4}" type="datetimeFigureOut">
               <a:rPr lang="en-IE" smtClean="0"/>
-              <a:t>27/01/2025</a:t>
+              <a:t>09/04/2025</a:t>
             </a:fld>
             <a:endParaRPr lang="en-IE"/>
           </a:p>
@@ -2884,7 +2836,7 @@
           <a:p>
             <a:fld id="{0D2FAE0B-8C89-473C-9622-2CC9A4826BE4}" type="datetimeFigureOut">
               <a:rPr lang="en-IE" smtClean="0"/>
-              <a:t>27/01/2025</a:t>
+              <a:t>09/04/2025</a:t>
             </a:fld>
             <a:endParaRPr lang="en-IE"/>
           </a:p>
@@ -3127,7 +3079,7 @@
           <a:p>
             <a:fld id="{0D2FAE0B-8C89-473C-9622-2CC9A4826BE4}" type="datetimeFigureOut">
               <a:rPr lang="en-IE" smtClean="0"/>
-              <a:t>27/01/2025</a:t>
+              <a:t>09/04/2025</a:t>
             </a:fld>
             <a:endParaRPr lang="en-IE"/>
           </a:p>
@@ -3546,10 +3498,10 @@
       </p:grpSpPr>
       <p:grpSp>
         <p:nvGrpSpPr>
-          <p:cNvPr id="71" name="Group 70">
-            <a:extLst>
-              <a:ext uri="{FF2B5EF4-FFF2-40B4-BE49-F238E27FC236}">
-                <a16:creationId xmlns:a16="http://schemas.microsoft.com/office/drawing/2014/main" id="{B016B8CC-5230-F7C0-D983-60CADCC724FE}"/>
+          <p:cNvPr id="65" name="Group 64">
+            <a:extLst>
+              <a:ext uri="{FF2B5EF4-FFF2-40B4-BE49-F238E27FC236}">
+                <a16:creationId xmlns:a16="http://schemas.microsoft.com/office/drawing/2014/main" id="{3E5AEAE9-1421-3AEF-FB68-7016EE66571E}"/>
               </a:ext>
             </a:extLst>
           </p:cNvPr>
@@ -3558,18 +3510,18 @@
         </p:nvGrpSpPr>
         <p:grpSpPr>
           <a:xfrm>
-            <a:off x="2795505" y="2411755"/>
-            <a:ext cx="4565416" cy="1478720"/>
-            <a:chOff x="2864084" y="2418090"/>
-            <a:chExt cx="5526783" cy="1856583"/>
+            <a:off x="2563094" y="2514600"/>
+            <a:ext cx="2252745" cy="1520655"/>
+            <a:chOff x="2862059" y="2321605"/>
+            <a:chExt cx="2620019" cy="1953069"/>
           </a:xfrm>
         </p:grpSpPr>
         <p:grpSp>
           <p:nvGrpSpPr>
-            <p:cNvPr id="65" name="Group 64">
+            <p:cNvPr id="52" name="Group 51">
               <a:extLst>
                 <a:ext uri="{FF2B5EF4-FFF2-40B4-BE49-F238E27FC236}">
-                  <a16:creationId xmlns:a16="http://schemas.microsoft.com/office/drawing/2014/main" id="{3E5AEAE9-1421-3AEF-FB68-7016EE66571E}"/>
+                  <a16:creationId xmlns:a16="http://schemas.microsoft.com/office/drawing/2014/main" id="{F773C49C-2330-9033-ADD9-5D608947436E}"/>
                 </a:ext>
               </a:extLst>
             </p:cNvPr>
@@ -3578,18 +3530,18 @@
           </p:nvGrpSpPr>
           <p:grpSpPr>
             <a:xfrm>
-              <a:off x="2864084" y="2453903"/>
-              <a:ext cx="2717152" cy="1820770"/>
-              <a:chOff x="2862059" y="2321605"/>
-              <a:chExt cx="2620019" cy="1953069"/>
+              <a:off x="2862059" y="2321605"/>
+              <a:ext cx="2620019" cy="1953069"/>
+              <a:chOff x="2873915" y="1012231"/>
+              <a:chExt cx="3188489" cy="3209750"/>
             </a:xfrm>
           </p:grpSpPr>
           <p:grpSp>
             <p:nvGrpSpPr>
-              <p:cNvPr id="52" name="Group 51">
+              <p:cNvPr id="12" name="Group 11">
                 <a:extLst>
                   <a:ext uri="{FF2B5EF4-FFF2-40B4-BE49-F238E27FC236}">
-                    <a16:creationId xmlns:a16="http://schemas.microsoft.com/office/drawing/2014/main" id="{F773C49C-2330-9033-ADD9-5D608947436E}"/>
+                    <a16:creationId xmlns:a16="http://schemas.microsoft.com/office/drawing/2014/main" id="{7DB1FB31-087F-30A0-B122-FA1A6833D1BD}"/>
                   </a:ext>
                 </a:extLst>
               </p:cNvPr>
@@ -3598,798 +3550,18 @@
             </p:nvGrpSpPr>
             <p:grpSpPr>
               <a:xfrm>
-                <a:off x="2862059" y="2321605"/>
-                <a:ext cx="2620019" cy="1953069"/>
-                <a:chOff x="2873915" y="1012231"/>
-                <a:chExt cx="3188489" cy="3209750"/>
+                <a:off x="2873915" y="2520456"/>
+                <a:ext cx="3126358" cy="1701525"/>
+                <a:chOff x="2242496" y="1889090"/>
+                <a:chExt cx="5168571" cy="3094892"/>
               </a:xfrm>
             </p:grpSpPr>
-            <p:grpSp>
-              <p:nvGrpSpPr>
-                <p:cNvPr id="12" name="Group 11">
+            <p:sp>
+              <p:nvSpPr>
+                <p:cNvPr id="4" name="Oval 3">
                   <a:extLst>
                     <a:ext uri="{FF2B5EF4-FFF2-40B4-BE49-F238E27FC236}">
-                      <a16:creationId xmlns:a16="http://schemas.microsoft.com/office/drawing/2014/main" id="{7DB1FB31-087F-30A0-B122-FA1A6833D1BD}"/>
-                    </a:ext>
-                  </a:extLst>
-                </p:cNvPr>
-                <p:cNvGrpSpPr/>
-                <p:nvPr/>
-              </p:nvGrpSpPr>
-              <p:grpSpPr>
-                <a:xfrm>
-                  <a:off x="2873915" y="2520456"/>
-                  <a:ext cx="3126358" cy="1701525"/>
-                  <a:chOff x="2242496" y="1889090"/>
-                  <a:chExt cx="5168571" cy="3094892"/>
-                </a:xfrm>
-              </p:grpSpPr>
-              <p:sp>
-                <p:nvSpPr>
-                  <p:cNvPr id="4" name="Oval 3">
-                    <a:extLst>
-                      <a:ext uri="{FF2B5EF4-FFF2-40B4-BE49-F238E27FC236}">
-                        <a16:creationId xmlns:a16="http://schemas.microsoft.com/office/drawing/2014/main" id="{216269BF-F862-C4FA-A90B-893616326C6C}"/>
-                      </a:ext>
-                    </a:extLst>
-                  </p:cNvPr>
-                  <p:cNvSpPr/>
-                  <p:nvPr/>
-                </p:nvSpPr>
-                <p:spPr>
-                  <a:xfrm>
-                    <a:off x="2863781" y="1889090"/>
-                    <a:ext cx="4303936" cy="3094892"/>
-                  </a:xfrm>
-                  <a:prstGeom prst="ellipse">
-                    <a:avLst/>
-                  </a:prstGeom>
-                  <a:noFill/>
-                  <a:ln w="76200">
-                    <a:solidFill>
-                      <a:schemeClr val="accent2">
-                        <a:lumMod val="75000"/>
-                      </a:schemeClr>
-                    </a:solidFill>
-                  </a:ln>
-                </p:spPr>
-                <p:style>
-                  <a:lnRef idx="2">
-                    <a:schemeClr val="accent1">
-                      <a:shade val="15000"/>
-                    </a:schemeClr>
-                  </a:lnRef>
-                  <a:fillRef idx="1">
-                    <a:schemeClr val="accent1"/>
-                  </a:fillRef>
-                  <a:effectRef idx="0">
-                    <a:schemeClr val="accent1"/>
-                  </a:effectRef>
-                  <a:fontRef idx="minor">
-                    <a:schemeClr val="lt1"/>
-                  </a:fontRef>
-                </p:style>
-                <p:txBody>
-                  <a:bodyPr rtlCol="0" anchor="ctr"/>
-                  <a:lstStyle/>
-                  <a:p>
-                    <a:pPr algn="ctr"/>
-                    <a:endParaRPr lang="en-IE"/>
-                  </a:p>
-                </p:txBody>
-              </p:sp>
-              <mc:AlternateContent xmlns:mc="http://schemas.openxmlformats.org/markup-compatibility/2006" xmlns:a14="http://schemas.microsoft.com/office/drawing/2010/main">
-                <mc:Choice Requires="a14">
-                  <p:sp>
-                    <p:nvSpPr>
-                      <p:cNvPr id="5" name="Oval 4">
-                        <a:extLst>
-                          <a:ext uri="{FF2B5EF4-FFF2-40B4-BE49-F238E27FC236}">
-                            <a16:creationId xmlns:a16="http://schemas.microsoft.com/office/drawing/2014/main" id="{65C5272B-A118-4AB7-5B1F-E135FB8EF2F4}"/>
-                          </a:ext>
-                        </a:extLst>
-                      </p:cNvPr>
-                      <p:cNvSpPr/>
-                      <p:nvPr/>
-                    </p:nvSpPr>
-                    <p:spPr>
-                      <a:xfrm rot="900645">
-                        <a:off x="2242496" y="2423835"/>
-                        <a:ext cx="1171180" cy="1738773"/>
-                      </a:xfrm>
-                      <a:prstGeom prst="ellipse">
-                        <a:avLst/>
-                      </a:prstGeom>
-                      <a:solidFill>
-                        <a:srgbClr val="FFC000"/>
-                      </a:solidFill>
-                      <a:ln>
-                        <a:noFill/>
-                      </a:ln>
-                    </p:spPr>
-                    <p:style>
-                      <a:lnRef idx="2">
-                        <a:schemeClr val="accent1">
-                          <a:shade val="15000"/>
-                        </a:schemeClr>
-                      </a:lnRef>
-                      <a:fillRef idx="1">
-                        <a:schemeClr val="accent1"/>
-                      </a:fillRef>
-                      <a:effectRef idx="0">
-                        <a:schemeClr val="accent1"/>
-                      </a:effectRef>
-                      <a:fontRef idx="minor">
-                        <a:schemeClr val="lt1"/>
-                      </a:fontRef>
-                    </p:style>
-                    <p:txBody>
-                      <a:bodyPr rtlCol="0" anchor="ctr"/>
-                      <a:lstStyle/>
-                      <a:p>
-                        <a:pPr algn="ctr"/>
-                        <a14:m>
-                          <m:oMathPara xmlns:m="http://schemas.openxmlformats.org/officeDocument/2006/math">
-                            <m:oMathParaPr>
-                              <m:jc m:val="centerGroup"/>
-                            </m:oMathParaPr>
-                            <m:oMath xmlns:m="http://schemas.openxmlformats.org/officeDocument/2006/math">
-                              <m:sSub>
-                                <m:sSubPr>
-                                  <m:ctrlPr>
-                                    <a:rPr lang="en-GB" sz="1600" b="1" i="1" smtClean="0">
-                                      <a:latin typeface="Cambria Math" panose="02040503050406030204" pitchFamily="18" charset="0"/>
-                                    </a:rPr>
-                                  </m:ctrlPr>
-                                </m:sSubPr>
-                                <m:e>
-                                  <m:r>
-                                    <a:rPr lang="en-GB" sz="1600" b="1" i="1" smtClean="0">
-                                      <a:latin typeface="Cambria Math" panose="02040503050406030204" pitchFamily="18" charset="0"/>
-                                    </a:rPr>
-                                    <m:t>𝑴</m:t>
-                                  </m:r>
-                                </m:e>
-                                <m:sub>
-                                  <m:r>
-                                    <a:rPr lang="en-GB" sz="1600" b="1" i="1" smtClean="0">
-                                      <a:latin typeface="Cambria Math" panose="02040503050406030204" pitchFamily="18" charset="0"/>
-                                    </a:rPr>
-                                    <m:t>𝟏</m:t>
-                                  </m:r>
-                                </m:sub>
-                              </m:sSub>
-                            </m:oMath>
-                          </m:oMathPara>
-                        </a14:m>
-                        <a:endParaRPr lang="en-GB" sz="1600" b="1" dirty="0"/>
-                      </a:p>
-                    </p:txBody>
-                  </p:sp>
-                </mc:Choice>
-                <mc:Fallback xmlns="">
-                  <p:sp>
-                    <p:nvSpPr>
-                      <p:cNvPr id="5" name="Oval 4">
-                        <a:extLst>
-                          <a:ext uri="{FF2B5EF4-FFF2-40B4-BE49-F238E27FC236}">
-                            <a16:creationId xmlns:a16="http://schemas.microsoft.com/office/drawing/2014/main" id="{65C5272B-A118-4AB7-5B1F-E135FB8EF2F4}"/>
-                          </a:ext>
-                        </a:extLst>
-                      </p:cNvPr>
-                      <p:cNvSpPr>
-                        <a:spLocks noRot="1" noChangeAspect="1" noMove="1" noResize="1" noEditPoints="1" noAdjustHandles="1" noChangeArrowheads="1" noChangeShapeType="1" noTextEdit="1"/>
-                      </p:cNvSpPr>
-                      <p:nvPr/>
-                    </p:nvSpPr>
-                    <p:spPr>
-                      <a:xfrm rot="900645">
-                        <a:off x="2242496" y="2423835"/>
-                        <a:ext cx="1171180" cy="1738773"/>
-                      </a:xfrm>
-                      <a:prstGeom prst="ellipse">
-                        <a:avLst/>
-                      </a:prstGeom>
-                      <a:blipFill>
-                        <a:blip r:embed="rId2"/>
-                        <a:stretch>
-                          <a:fillRect/>
-                        </a:stretch>
-                      </a:blipFill>
-                      <a:ln>
-                        <a:noFill/>
-                      </a:ln>
-                    </p:spPr>
-                    <p:txBody>
-                      <a:bodyPr/>
-                      <a:lstStyle/>
-                      <a:p>
-                        <a:r>
-                          <a:rPr lang="en-IE">
-                            <a:noFill/>
-                          </a:rPr>
-                          <a:t> </a:t>
-                        </a:r>
-                      </a:p>
-                    </p:txBody>
-                  </p:sp>
-                </mc:Fallback>
-              </mc:AlternateContent>
-              <mc:AlternateContent xmlns:mc="http://schemas.openxmlformats.org/markup-compatibility/2006">
-                <mc:Choice xmlns:a14="http://schemas.microsoft.com/office/drawing/2010/main" Requires="a14">
-                  <p:sp>
-                    <p:nvSpPr>
-                      <p:cNvPr id="6" name="Oval 5">
-                        <a:extLst>
-                          <a:ext uri="{FF2B5EF4-FFF2-40B4-BE49-F238E27FC236}">
-                            <a16:creationId xmlns:a16="http://schemas.microsoft.com/office/drawing/2014/main" id="{C58557E8-AE07-E90D-4FF1-BFE8138053BD}"/>
-                          </a:ext>
-                        </a:extLst>
-                      </p:cNvPr>
-                      <p:cNvSpPr/>
-                      <p:nvPr/>
-                    </p:nvSpPr>
-                    <p:spPr>
-                      <a:xfrm>
-                        <a:off x="6719723" y="2770313"/>
-                        <a:ext cx="691344" cy="1150778"/>
-                      </a:xfrm>
-                      <a:prstGeom prst="ellipse">
-                        <a:avLst/>
-                      </a:prstGeom>
-                      <a:solidFill>
-                        <a:schemeClr val="tx2">
-                          <a:lumMod val="25000"/>
-                          <a:lumOff val="75000"/>
-                        </a:schemeClr>
-                      </a:solidFill>
-                      <a:ln>
-                        <a:noFill/>
-                      </a:ln>
-                    </p:spPr>
-                    <p:style>
-                      <a:lnRef idx="2">
-                        <a:schemeClr val="accent1">
-                          <a:shade val="15000"/>
-                        </a:schemeClr>
-                      </a:lnRef>
-                      <a:fillRef idx="1">
-                        <a:schemeClr val="accent1"/>
-                      </a:fillRef>
-                      <a:effectRef idx="0">
-                        <a:schemeClr val="accent1"/>
-                      </a:effectRef>
-                      <a:fontRef idx="minor">
-                        <a:schemeClr val="lt1"/>
-                      </a:fontRef>
-                    </p:style>
-                    <p:txBody>
-                      <a:bodyPr rtlCol="0" anchor="ctr"/>
-                      <a:lstStyle/>
-                      <a:p>
-                        <a:pPr algn="ctr"/>
-                        <a14:m>
-                          <m:oMathPara xmlns:m="http://schemas.openxmlformats.org/officeDocument/2006/math">
-                            <m:oMathParaPr>
-                              <m:jc m:val="centerGroup"/>
-                            </m:oMathParaPr>
-                            <m:oMath xmlns:m="http://schemas.openxmlformats.org/officeDocument/2006/math">
-                              <m:sSub>
-                                <m:sSubPr>
-                                  <m:ctrlPr>
-                                    <a:rPr lang="en-GB" sz="1600" b="0" i="1" smtClean="0">
-                                      <a:latin typeface="Cambria Math" panose="02040503050406030204" pitchFamily="18" charset="0"/>
-                                    </a:rPr>
-                                  </m:ctrlPr>
-                                </m:sSubPr>
-                                <m:e>
-                                  <m:r>
-                                    <a:rPr lang="en-GB" sz="1600" b="0" i="1" smtClean="0">
-                                      <a:latin typeface="Cambria Math" panose="02040503050406030204" pitchFamily="18" charset="0"/>
-                                    </a:rPr>
-                                    <m:t>𝑀</m:t>
-                                  </m:r>
-                                </m:e>
-                                <m:sub>
-                                  <m:r>
-                                    <a:rPr lang="en-GB" sz="1600" b="0" i="1" smtClean="0">
-                                      <a:latin typeface="Cambria Math" panose="02040503050406030204" pitchFamily="18" charset="0"/>
-                                    </a:rPr>
-                                    <m:t>2</m:t>
-                                  </m:r>
-                                </m:sub>
-                              </m:sSub>
-                            </m:oMath>
-                          </m:oMathPara>
-                        </a14:m>
-                        <a:endParaRPr lang="en-GB" sz="1600" b="0" dirty="0"/>
-                      </a:p>
-                    </p:txBody>
-                  </p:sp>
-                </mc:Choice>
-                <mc:Fallback>
-                  <p:sp>
-                    <p:nvSpPr>
-                      <p:cNvPr id="6" name="Oval 5">
-                        <a:extLst>
-                          <a:ext uri="{FF2B5EF4-FFF2-40B4-BE49-F238E27FC236}">
-                            <a16:creationId xmlns:a16="http://schemas.microsoft.com/office/drawing/2014/main" id="{C58557E8-AE07-E90D-4FF1-BFE8138053BD}"/>
-                          </a:ext>
-                        </a:extLst>
-                      </p:cNvPr>
-                      <p:cNvSpPr>
-                        <a:spLocks noRot="1" noChangeAspect="1" noMove="1" noResize="1" noEditPoints="1" noAdjustHandles="1" noChangeArrowheads="1" noChangeShapeType="1" noTextEdit="1"/>
-                      </p:cNvSpPr>
-                      <p:nvPr/>
-                    </p:nvSpPr>
-                    <p:spPr>
-                      <a:xfrm>
-                        <a:off x="6719723" y="2770313"/>
-                        <a:ext cx="691344" cy="1150778"/>
-                      </a:xfrm>
-                      <a:prstGeom prst="ellipse">
-                        <a:avLst/>
-                      </a:prstGeom>
-                      <a:blipFill>
-                        <a:blip r:embed="rId3"/>
-                        <a:stretch>
-                          <a:fillRect l="-22449" b="-4255"/>
-                        </a:stretch>
-                      </a:blipFill>
-                      <a:ln>
-                        <a:noFill/>
-                      </a:ln>
-                    </p:spPr>
-                    <p:txBody>
-                      <a:bodyPr/>
-                      <a:lstStyle/>
-                      <a:p>
-                        <a:r>
-                          <a:rPr lang="en-IE">
-                            <a:noFill/>
-                          </a:rPr>
-                          <a:t> </a:t>
-                        </a:r>
-                      </a:p>
-                    </p:txBody>
-                  </p:sp>
-                </mc:Fallback>
-              </mc:AlternateContent>
-            </p:grpSp>
-            <p:cxnSp>
-              <p:nvCxnSpPr>
-                <p:cNvPr id="18" name="Straight Connector 17">
-                  <a:extLst>
-                    <a:ext uri="{FF2B5EF4-FFF2-40B4-BE49-F238E27FC236}">
-                      <a16:creationId xmlns:a16="http://schemas.microsoft.com/office/drawing/2014/main" id="{A53C79B1-AD74-211C-D76C-5D3C2E1D63ED}"/>
-                    </a:ext>
-                  </a:extLst>
-                </p:cNvPr>
-                <p:cNvCxnSpPr>
-                  <a:cxnSpLocks/>
-                </p:cNvCxnSpPr>
-                <p:nvPr/>
-              </p:nvCxnSpPr>
-              <p:spPr>
-                <a:xfrm flipH="1">
-                  <a:off x="3378360" y="2441924"/>
-                  <a:ext cx="151211" cy="434750"/>
-                </a:xfrm>
-                <a:prstGeom prst="line">
-                  <a:avLst/>
-                </a:prstGeom>
-                <a:ln>
-                  <a:solidFill>
-                    <a:schemeClr val="tx1"/>
-                  </a:solidFill>
-                </a:ln>
-              </p:spPr>
-              <p:style>
-                <a:lnRef idx="2">
-                  <a:schemeClr val="accent1"/>
-                </a:lnRef>
-                <a:fillRef idx="0">
-                  <a:schemeClr val="accent1"/>
-                </a:fillRef>
-                <a:effectRef idx="1">
-                  <a:schemeClr val="accent1"/>
-                </a:effectRef>
-                <a:fontRef idx="minor">
-                  <a:schemeClr val="tx1"/>
-                </a:fontRef>
-              </p:style>
-            </p:cxnSp>
-            <p:sp>
-              <p:nvSpPr>
-                <p:cNvPr id="25" name="Flowchart: Extract 24">
-                  <a:extLst>
-                    <a:ext uri="{FF2B5EF4-FFF2-40B4-BE49-F238E27FC236}">
-                      <a16:creationId xmlns:a16="http://schemas.microsoft.com/office/drawing/2014/main" id="{9155E074-C6FE-CFA5-5198-32CB11C3C4F3}"/>
-                    </a:ext>
-                  </a:extLst>
-                </p:cNvPr>
-                <p:cNvSpPr/>
-                <p:nvPr/>
-              </p:nvSpPr>
-              <p:spPr>
-                <a:xfrm rot="1416487">
-                  <a:off x="3429764" y="2265048"/>
-                  <a:ext cx="236247" cy="229180"/>
-                </a:xfrm>
-                <a:prstGeom prst="flowChartExtract">
-                  <a:avLst/>
-                </a:prstGeom>
-                <a:solidFill>
-                  <a:schemeClr val="tx1"/>
-                </a:solidFill>
-              </p:spPr>
-              <p:style>
-                <a:lnRef idx="2">
-                  <a:schemeClr val="accent1">
-                    <a:shade val="15000"/>
-                  </a:schemeClr>
-                </a:lnRef>
-                <a:fillRef idx="1">
-                  <a:schemeClr val="accent1"/>
-                </a:fillRef>
-                <a:effectRef idx="0">
-                  <a:schemeClr val="accent1"/>
-                </a:effectRef>
-                <a:fontRef idx="minor">
-                  <a:schemeClr val="lt1"/>
-                </a:fontRef>
-              </p:style>
-              <p:txBody>
-                <a:bodyPr rtlCol="0" anchor="ctr"/>
-                <a:lstStyle/>
-                <a:p>
-                  <a:pPr algn="ctr"/>
-                  <a:endParaRPr lang="en-IE" dirty="0"/>
-                </a:p>
-              </p:txBody>
-            </p:sp>
-            <mc:AlternateContent xmlns:mc="http://schemas.openxmlformats.org/markup-compatibility/2006">
-              <mc:Choice xmlns:a14="http://schemas.microsoft.com/office/drawing/2010/main" Requires="a14">
-                <p:sp>
-                  <p:nvSpPr>
-                    <p:cNvPr id="26" name="TextBox 25">
-                      <a:extLst>
-                        <a:ext uri="{FF2B5EF4-FFF2-40B4-BE49-F238E27FC236}">
-                          <a16:creationId xmlns:a16="http://schemas.microsoft.com/office/drawing/2014/main" id="{5D321EF4-B798-22C3-D34E-FA0B1D7FCCF5}"/>
-                        </a:ext>
-                      </a:extLst>
-                    </p:cNvPr>
-                    <p:cNvSpPr txBox="1"/>
-                    <p:nvPr/>
-                  </p:nvSpPr>
-                  <p:spPr>
-                    <a:xfrm>
-                      <a:off x="5625449" y="2078222"/>
-                      <a:ext cx="436955" cy="613088"/>
-                    </a:xfrm>
-                    <a:prstGeom prst="rect">
-                      <a:avLst/>
-                    </a:prstGeom>
-                    <a:noFill/>
-                  </p:spPr>
-                  <p:txBody>
-                    <a:bodyPr wrap="square" rtlCol="0">
-                      <a:spAutoFit/>
-                    </a:bodyPr>
-                    <a:lstStyle/>
-                    <a:p>
-                      <a:pPr/>
-                      <a14:m>
-                        <m:oMathPara xmlns:m="http://schemas.openxmlformats.org/officeDocument/2006/math">
-                          <m:oMathParaPr>
-                            <m:jc m:val="centerGroup"/>
-                          </m:oMathParaPr>
-                          <m:oMath xmlns:m="http://schemas.openxmlformats.org/officeDocument/2006/math">
-                            <m:sSub>
-                              <m:sSubPr>
-                                <m:ctrlPr>
-                                  <a:rPr lang="en-IE" sz="1200" b="1" i="1" smtClean="0">
-                                    <a:latin typeface="Cambria Math" panose="02040503050406030204" pitchFamily="18" charset="0"/>
-                                  </a:rPr>
-                                </m:ctrlPr>
-                              </m:sSubPr>
-                              <m:e>
-                                <m:r>
-                                  <a:rPr lang="en-IE" sz="1200" b="1" i="1" smtClean="0">
-                                    <a:latin typeface="Cambria Math" panose="02040503050406030204" pitchFamily="18" charset="0"/>
-                                  </a:rPr>
-                                  <m:t>𝑺</m:t>
-                                </m:r>
-                              </m:e>
-                              <m:sub>
-                                <m:r>
-                                  <a:rPr lang="en-IE" sz="1200" b="1" i="1" smtClean="0">
-                                    <a:latin typeface="Cambria Math" panose="02040503050406030204" pitchFamily="18" charset="0"/>
-                                  </a:rPr>
-                                  <m:t>𝟐</m:t>
-                                </m:r>
-                              </m:sub>
-                            </m:sSub>
-                          </m:oMath>
-                        </m:oMathPara>
-                      </a14:m>
-                      <a:endParaRPr lang="en-IE" sz="1200" b="1" dirty="0"/>
-                    </a:p>
-                  </p:txBody>
-                </p:sp>
-              </mc:Choice>
-              <mc:Fallback>
-                <p:sp>
-                  <p:nvSpPr>
-                    <p:cNvPr id="26" name="TextBox 25">
-                      <a:extLst>
-                        <a:ext uri="{FF2B5EF4-FFF2-40B4-BE49-F238E27FC236}">
-                          <a16:creationId xmlns:a16="http://schemas.microsoft.com/office/drawing/2014/main" id="{5D321EF4-B798-22C3-D34E-FA0B1D7FCCF5}"/>
-                        </a:ext>
-                      </a:extLst>
-                    </p:cNvPr>
-                    <p:cNvSpPr txBox="1">
-                      <a:spLocks noRot="1" noChangeAspect="1" noMove="1" noResize="1" noEditPoints="1" noAdjustHandles="1" noChangeArrowheads="1" noChangeShapeType="1" noTextEdit="1"/>
-                    </p:cNvSpPr>
-                    <p:nvPr/>
-                  </p:nvSpPr>
-                  <p:spPr>
-                    <a:xfrm>
-                      <a:off x="5625449" y="2078222"/>
-                      <a:ext cx="436955" cy="613088"/>
-                    </a:xfrm>
-                    <a:prstGeom prst="rect">
-                      <a:avLst/>
-                    </a:prstGeom>
-                    <a:blipFill>
-                      <a:blip r:embed="rId4"/>
-                      <a:stretch>
-                        <a:fillRect/>
-                      </a:stretch>
-                    </a:blipFill>
-                  </p:spPr>
-                  <p:txBody>
-                    <a:bodyPr/>
-                    <a:lstStyle/>
-                    <a:p>
-                      <a:r>
-                        <a:rPr lang="en-IE">
-                          <a:noFill/>
-                        </a:rPr>
-                        <a:t> </a:t>
-                      </a:r>
-                    </a:p>
-                  </p:txBody>
-                </p:sp>
-              </mc:Fallback>
-            </mc:AlternateContent>
-            <p:cxnSp>
-              <p:nvCxnSpPr>
-                <p:cNvPr id="28" name="Straight Connector 27">
-                  <a:extLst>
-                    <a:ext uri="{FF2B5EF4-FFF2-40B4-BE49-F238E27FC236}">
-                      <a16:creationId xmlns:a16="http://schemas.microsoft.com/office/drawing/2014/main" id="{2080E814-9D4D-0EC5-5742-6E2C29099F44}"/>
-                    </a:ext>
-                  </a:extLst>
-                </p:cNvPr>
-                <p:cNvCxnSpPr>
-                  <a:cxnSpLocks/>
-                </p:cNvCxnSpPr>
-                <p:nvPr/>
-              </p:nvCxnSpPr>
-              <p:spPr>
-                <a:xfrm flipH="1" flipV="1">
-                  <a:off x="5550485" y="2421670"/>
-                  <a:ext cx="199550" cy="602851"/>
-                </a:xfrm>
-                <a:prstGeom prst="line">
-                  <a:avLst/>
-                </a:prstGeom>
-                <a:ln>
-                  <a:solidFill>
-                    <a:schemeClr val="tx1"/>
-                  </a:solidFill>
-                </a:ln>
-              </p:spPr>
-              <p:style>
-                <a:lnRef idx="2">
-                  <a:schemeClr val="accent1"/>
-                </a:lnRef>
-                <a:fillRef idx="0">
-                  <a:schemeClr val="accent1"/>
-                </a:fillRef>
-                <a:effectRef idx="1">
-                  <a:schemeClr val="accent1"/>
-                </a:effectRef>
-                <a:fontRef idx="minor">
-                  <a:schemeClr val="tx1"/>
-                </a:fontRef>
-              </p:style>
-            </p:cxnSp>
-            <p:sp>
-              <p:nvSpPr>
-                <p:cNvPr id="29" name="Flowchart: Extract 28">
-                  <a:extLst>
-                    <a:ext uri="{FF2B5EF4-FFF2-40B4-BE49-F238E27FC236}">
-                      <a16:creationId xmlns:a16="http://schemas.microsoft.com/office/drawing/2014/main" id="{9B2A9400-A704-2D26-327F-02D244307D0B}"/>
-                    </a:ext>
-                  </a:extLst>
-                </p:cNvPr>
-                <p:cNvSpPr/>
-                <p:nvPr/>
-              </p:nvSpPr>
-              <p:spPr>
-                <a:xfrm rot="20155868">
-                  <a:off x="5425260" y="2269187"/>
-                  <a:ext cx="218468" cy="229545"/>
-                </a:xfrm>
-                <a:prstGeom prst="flowChartExtract">
-                  <a:avLst/>
-                </a:prstGeom>
-                <a:solidFill>
-                  <a:schemeClr val="tx1"/>
-                </a:solidFill>
-              </p:spPr>
-              <p:style>
-                <a:lnRef idx="2">
-                  <a:schemeClr val="accent1">
-                    <a:shade val="15000"/>
-                  </a:schemeClr>
-                </a:lnRef>
-                <a:fillRef idx="1">
-                  <a:schemeClr val="accent1"/>
-                </a:fillRef>
-                <a:effectRef idx="0">
-                  <a:schemeClr val="accent1"/>
-                </a:effectRef>
-                <a:fontRef idx="minor">
-                  <a:schemeClr val="lt1"/>
-                </a:fontRef>
-              </p:style>
-              <p:txBody>
-                <a:bodyPr rtlCol="0" anchor="ctr"/>
-                <a:lstStyle/>
-                <a:p>
-                  <a:pPr algn="ctr"/>
-                  <a:endParaRPr lang="en-IE" dirty="0"/>
-                </a:p>
-              </p:txBody>
-            </p:sp>
-            <mc:AlternateContent xmlns:mc="http://schemas.openxmlformats.org/markup-compatibility/2006">
-              <mc:Choice xmlns:a14="http://schemas.microsoft.com/office/drawing/2010/main" Requires="a14">
-                <p:sp>
-                  <p:nvSpPr>
-                    <p:cNvPr id="30" name="TextBox 29">
-                      <a:extLst>
-                        <a:ext uri="{FF2B5EF4-FFF2-40B4-BE49-F238E27FC236}">
-                          <a16:creationId xmlns:a16="http://schemas.microsoft.com/office/drawing/2014/main" id="{6FE28D49-6B54-4D06-14E4-7188FB3FAFAC}"/>
-                        </a:ext>
-                      </a:extLst>
-                    </p:cNvPr>
-                    <p:cNvSpPr txBox="1"/>
-                    <p:nvPr/>
-                  </p:nvSpPr>
-                  <p:spPr>
-                    <a:xfrm>
-                      <a:off x="3014563" y="1808582"/>
-                      <a:ext cx="436955" cy="613088"/>
-                    </a:xfrm>
-                    <a:prstGeom prst="rect">
-                      <a:avLst/>
-                    </a:prstGeom>
-                    <a:noFill/>
-                  </p:spPr>
-                  <p:txBody>
-                    <a:bodyPr wrap="square" rtlCol="0">
-                      <a:spAutoFit/>
-                    </a:bodyPr>
-                    <a:lstStyle/>
-                    <a:p>
-                      <a:pPr/>
-                      <a14:m>
-                        <m:oMathPara xmlns:m="http://schemas.openxmlformats.org/officeDocument/2006/math">
-                          <m:oMathParaPr>
-                            <m:jc m:val="centerGroup"/>
-                          </m:oMathParaPr>
-                          <m:oMath xmlns:m="http://schemas.openxmlformats.org/officeDocument/2006/math">
-                            <m:sSub>
-                              <m:sSubPr>
-                                <m:ctrlPr>
-                                  <a:rPr lang="en-IE" sz="1200" b="1" i="1" kern="100" smtClean="0">
-                                    <a:effectLst/>
-                                    <a:latin typeface="Cambria Math" panose="02040503050406030204" pitchFamily="18" charset="0"/>
-                                    <a:ea typeface="Aptos" panose="020B0004020202020204" pitchFamily="34" charset="0"/>
-                                    <a:cs typeface="Times New Roman" panose="02020603050405020304" pitchFamily="18" charset="0"/>
-                                  </a:rPr>
-                                </m:ctrlPr>
-                              </m:sSubPr>
-                              <m:e>
-                                <m:r>
-                                  <a:rPr lang="en-IE" sz="1200" b="1" i="1" kern="100" smtClean="0">
-                                    <a:effectLst/>
-                                    <a:latin typeface="Cambria Math" panose="02040503050406030204" pitchFamily="18" charset="0"/>
-                                    <a:ea typeface="Aptos" panose="020B0004020202020204" pitchFamily="34" charset="0"/>
-                                    <a:cs typeface="Times New Roman" panose="02020603050405020304" pitchFamily="18" charset="0"/>
-                                  </a:rPr>
-                                  <m:t>𝑺</m:t>
-                                </m:r>
-                              </m:e>
-                              <m:sub>
-                                <m:r>
-                                  <a:rPr lang="en-IE" sz="1200" b="1" i="1" kern="100" smtClean="0">
-                                    <a:effectLst/>
-                                    <a:latin typeface="Cambria Math" panose="02040503050406030204" pitchFamily="18" charset="0"/>
-                                    <a:ea typeface="Aptos" panose="020B0004020202020204" pitchFamily="34" charset="0"/>
-                                    <a:cs typeface="Times New Roman" panose="02020603050405020304" pitchFamily="18" charset="0"/>
-                                  </a:rPr>
-                                  <m:t>𝟏</m:t>
-                                </m:r>
-                              </m:sub>
-                            </m:sSub>
-                          </m:oMath>
-                        </m:oMathPara>
-                      </a14:m>
-                      <a:endParaRPr lang="en-IE" sz="1200" b="1" kern="100" dirty="0">
-                        <a:effectLst/>
-                        <a:latin typeface="Aptos" panose="020B0004020202020204" pitchFamily="34" charset="0"/>
-                        <a:ea typeface="Aptos" panose="020B0004020202020204" pitchFamily="34" charset="0"/>
-                        <a:cs typeface="Times New Roman" panose="02020603050405020304" pitchFamily="18" charset="0"/>
-                      </a:endParaRPr>
-                    </a:p>
-                  </p:txBody>
-                </p:sp>
-              </mc:Choice>
-              <mc:Fallback>
-                <p:sp>
-                  <p:nvSpPr>
-                    <p:cNvPr id="30" name="TextBox 29">
-                      <a:extLst>
-                        <a:ext uri="{FF2B5EF4-FFF2-40B4-BE49-F238E27FC236}">
-                          <a16:creationId xmlns:a16="http://schemas.microsoft.com/office/drawing/2014/main" id="{6FE28D49-6B54-4D06-14E4-7188FB3FAFAC}"/>
-                        </a:ext>
-                      </a:extLst>
-                    </p:cNvPr>
-                    <p:cNvSpPr txBox="1">
-                      <a:spLocks noRot="1" noChangeAspect="1" noMove="1" noResize="1" noEditPoints="1" noAdjustHandles="1" noChangeArrowheads="1" noChangeShapeType="1" noTextEdit="1"/>
-                    </p:cNvSpPr>
-                    <p:nvPr/>
-                  </p:nvSpPr>
-                  <p:spPr>
-                    <a:xfrm>
-                      <a:off x="3014563" y="1808582"/>
-                      <a:ext cx="436955" cy="613088"/>
-                    </a:xfrm>
-                    <a:prstGeom prst="rect">
-                      <a:avLst/>
-                    </a:prstGeom>
-                    <a:blipFill>
-                      <a:blip r:embed="rId5"/>
-                      <a:stretch>
-                        <a:fillRect/>
-                      </a:stretch>
-                    </a:blipFill>
-                  </p:spPr>
-                  <p:txBody>
-                    <a:bodyPr/>
-                    <a:lstStyle/>
-                    <a:p>
-                      <a:r>
-                        <a:rPr lang="en-IE">
-                          <a:noFill/>
-                        </a:rPr>
-                        <a:t> </a:t>
-                      </a:r>
-                    </a:p>
-                  </p:txBody>
-                </p:sp>
-              </mc:Fallback>
-            </mc:AlternateContent>
-            <p:sp>
-              <p:nvSpPr>
-                <p:cNvPr id="31" name="Oval 30">
-                  <a:extLst>
-                    <a:ext uri="{FF2B5EF4-FFF2-40B4-BE49-F238E27FC236}">
-                      <a16:creationId xmlns:a16="http://schemas.microsoft.com/office/drawing/2014/main" id="{2705B5D3-956B-5F3A-DD6B-5C324F06DAE7}"/>
+                      <a16:creationId xmlns:a16="http://schemas.microsoft.com/office/drawing/2014/main" id="{216269BF-F862-C4FA-A90B-893616326C6C}"/>
                     </a:ext>
                   </a:extLst>
                 </p:cNvPr>
@@ -4398,146 +3570,20 @@
               </p:nvSpPr>
               <p:spPr>
                 <a:xfrm>
-                  <a:off x="4506426" y="3242076"/>
-                  <a:ext cx="232953" cy="285056"/>
+                  <a:off x="2863781" y="1889090"/>
+                  <a:ext cx="4303936" cy="3094892"/>
                 </a:xfrm>
                 <a:prstGeom prst="ellipse">
                   <a:avLst/>
                 </a:prstGeom>
-                <a:solidFill>
-                  <a:schemeClr val="tx1"/>
-                </a:solidFill>
-              </p:spPr>
-              <p:style>
-                <a:lnRef idx="2">
-                  <a:schemeClr val="accent1">
-                    <a:shade val="15000"/>
-                  </a:schemeClr>
-                </a:lnRef>
-                <a:fillRef idx="1">
-                  <a:schemeClr val="accent1"/>
-                </a:fillRef>
-                <a:effectRef idx="0">
-                  <a:schemeClr val="accent1"/>
-                </a:effectRef>
-                <a:fontRef idx="minor">
-                  <a:schemeClr val="lt1"/>
-                </a:fontRef>
-              </p:style>
-              <p:txBody>
-                <a:bodyPr rtlCol="0" anchor="ctr"/>
-                <a:lstStyle/>
-                <a:p>
-                  <a:pPr algn="ctr"/>
-                  <a:endParaRPr lang="en-IE" dirty="0"/>
-                </a:p>
-              </p:txBody>
-            </p:sp>
-            <p:cxnSp>
-              <p:nvCxnSpPr>
-                <p:cNvPr id="33" name="Straight Connector 32">
-                  <a:extLst>
-                    <a:ext uri="{FF2B5EF4-FFF2-40B4-BE49-F238E27FC236}">
-                      <a16:creationId xmlns:a16="http://schemas.microsoft.com/office/drawing/2014/main" id="{1C69F2E3-3F32-2A5F-8BDC-E032DAC60833}"/>
-                    </a:ext>
-                  </a:extLst>
-                </p:cNvPr>
-                <p:cNvCxnSpPr>
-                  <a:cxnSpLocks/>
-                </p:cNvCxnSpPr>
-                <p:nvPr/>
-              </p:nvCxnSpPr>
-              <p:spPr>
-                <a:xfrm flipV="1">
-                  <a:off x="4646309" y="1352151"/>
-                  <a:ext cx="7347" cy="1986246"/>
-                </a:xfrm>
-                <a:prstGeom prst="line">
-                  <a:avLst/>
-                </a:prstGeom>
-                <a:ln>
+                <a:noFill/>
+                <a:ln w="76200">
                   <a:solidFill>
-                    <a:schemeClr val="tx1"/>
+                    <a:schemeClr val="accent2">
+                      <a:lumMod val="75000"/>
+                    </a:schemeClr>
                   </a:solidFill>
                 </a:ln>
-              </p:spPr>
-              <p:style>
-                <a:lnRef idx="2">
-                  <a:schemeClr val="accent1"/>
-                </a:lnRef>
-                <a:fillRef idx="0">
-                  <a:schemeClr val="accent1"/>
-                </a:fillRef>
-                <a:effectRef idx="1">
-                  <a:schemeClr val="accent1"/>
-                </a:effectRef>
-                <a:fontRef idx="minor">
-                  <a:schemeClr val="tx1"/>
-                </a:fontRef>
-              </p:style>
-            </p:cxnSp>
-            <p:sp>
-              <p:nvSpPr>
-                <p:cNvPr id="34" name="TextBox 33">
-                  <a:extLst>
-                    <a:ext uri="{FF2B5EF4-FFF2-40B4-BE49-F238E27FC236}">
-                      <a16:creationId xmlns:a16="http://schemas.microsoft.com/office/drawing/2014/main" id="{73B6DB2D-BF8F-84D6-6F16-50A74AB53BFC}"/>
-                    </a:ext>
-                  </a:extLst>
-                </p:cNvPr>
-                <p:cNvSpPr txBox="1"/>
-                <p:nvPr/>
-              </p:nvSpPr>
-              <p:spPr>
-                <a:xfrm>
-                  <a:off x="4228974" y="1012231"/>
-                  <a:ext cx="309476" cy="613088"/>
-                </a:xfrm>
-                <a:prstGeom prst="rect">
-                  <a:avLst/>
-                </a:prstGeom>
-                <a:noFill/>
-              </p:spPr>
-              <p:txBody>
-                <a:bodyPr wrap="square" rtlCol="0">
-                  <a:spAutoFit/>
-                </a:bodyPr>
-                <a:lstStyle/>
-                <a:p>
-                  <a:pPr/>
-                  <a:r>
-                    <a:rPr lang="en-IE" sz="1200" b="1" i="1" kern="100" dirty="0">
-                      <a:latin typeface="Cambria Math" panose="02040503050406030204" pitchFamily="18" charset="0"/>
-                      <a:cs typeface="Times New Roman" panose="02020603050405020304" pitchFamily="18" charset="0"/>
-                    </a:rPr>
-                    <a:t>L</a:t>
-                  </a:r>
-                </a:p>
-              </p:txBody>
-            </p:sp>
-            <p:sp>
-              <p:nvSpPr>
-                <p:cNvPr id="35" name="Flowchart: Extract 34">
-                  <a:extLst>
-                    <a:ext uri="{FF2B5EF4-FFF2-40B4-BE49-F238E27FC236}">
-                      <a16:creationId xmlns:a16="http://schemas.microsoft.com/office/drawing/2014/main" id="{3254255B-259F-1A9E-F0B4-F6D1B4D71B47}"/>
-                    </a:ext>
-                  </a:extLst>
-                </p:cNvPr>
-                <p:cNvSpPr/>
-                <p:nvPr/>
-              </p:nvSpPr>
-              <p:spPr>
-                <a:xfrm>
-                  <a:off x="4551397" y="1113297"/>
-                  <a:ext cx="217249" cy="255639"/>
-                </a:xfrm>
-                <a:prstGeom prst="flowChartExtract">
-                  <a:avLst/>
-                </a:prstGeom>
-                <a:solidFill>
-                  <a:schemeClr val="tx1"/>
-                </a:solidFill>
               </p:spPr>
               <p:style>
                 <a:lnRef idx="2">
@@ -4564,13 +3610,290 @@
                 </a:p>
               </p:txBody>
             </p:sp>
+            <mc:AlternateContent xmlns:mc="http://schemas.openxmlformats.org/markup-compatibility/2006" xmlns:a14="http://schemas.microsoft.com/office/drawing/2010/main">
+              <mc:Choice Requires="a14">
+                <p:sp>
+                  <p:nvSpPr>
+                    <p:cNvPr id="5" name="Oval 4">
+                      <a:extLst>
+                        <a:ext uri="{FF2B5EF4-FFF2-40B4-BE49-F238E27FC236}">
+                          <a16:creationId xmlns:a16="http://schemas.microsoft.com/office/drawing/2014/main" id="{65C5272B-A118-4AB7-5B1F-E135FB8EF2F4}"/>
+                        </a:ext>
+                      </a:extLst>
+                    </p:cNvPr>
+                    <p:cNvSpPr/>
+                    <p:nvPr/>
+                  </p:nvSpPr>
+                  <p:spPr>
+                    <a:xfrm rot="900645">
+                      <a:off x="2242496" y="2423835"/>
+                      <a:ext cx="1171180" cy="1738773"/>
+                    </a:xfrm>
+                    <a:prstGeom prst="ellipse">
+                      <a:avLst/>
+                    </a:prstGeom>
+                    <a:solidFill>
+                      <a:srgbClr val="FFC000"/>
+                    </a:solidFill>
+                    <a:ln>
+                      <a:noFill/>
+                    </a:ln>
+                  </p:spPr>
+                  <p:style>
+                    <a:lnRef idx="2">
+                      <a:schemeClr val="accent1">
+                        <a:shade val="15000"/>
+                      </a:schemeClr>
+                    </a:lnRef>
+                    <a:fillRef idx="1">
+                      <a:schemeClr val="accent1"/>
+                    </a:fillRef>
+                    <a:effectRef idx="0">
+                      <a:schemeClr val="accent1"/>
+                    </a:effectRef>
+                    <a:fontRef idx="minor">
+                      <a:schemeClr val="lt1"/>
+                    </a:fontRef>
+                  </p:style>
+                  <p:txBody>
+                    <a:bodyPr rtlCol="0" anchor="ctr"/>
+                    <a:lstStyle/>
+                    <a:p>
+                      <a:pPr algn="ctr"/>
+                      <a14:m>
+                        <m:oMathPara xmlns:m="http://schemas.openxmlformats.org/officeDocument/2006/math">
+                          <m:oMathParaPr>
+                            <m:jc m:val="centerGroup"/>
+                          </m:oMathParaPr>
+                          <m:oMath xmlns:m="http://schemas.openxmlformats.org/officeDocument/2006/math">
+                            <m:sSub>
+                              <m:sSubPr>
+                                <m:ctrlPr>
+                                  <a:rPr lang="en-GB" sz="1600" b="1" i="1" smtClean="0">
+                                    <a:latin typeface="Cambria Math" panose="02040503050406030204" pitchFamily="18" charset="0"/>
+                                  </a:rPr>
+                                </m:ctrlPr>
+                              </m:sSubPr>
+                              <m:e>
+                                <m:r>
+                                  <a:rPr lang="en-GB" sz="1600" b="1" i="1" smtClean="0">
+                                    <a:latin typeface="Cambria Math" panose="02040503050406030204" pitchFamily="18" charset="0"/>
+                                  </a:rPr>
+                                  <m:t>𝑴</m:t>
+                                </m:r>
+                              </m:e>
+                              <m:sub>
+                                <m:r>
+                                  <a:rPr lang="en-GB" sz="1600" b="1" i="1" smtClean="0">
+                                    <a:latin typeface="Cambria Math" panose="02040503050406030204" pitchFamily="18" charset="0"/>
+                                  </a:rPr>
+                                  <m:t>𝟏</m:t>
+                                </m:r>
+                              </m:sub>
+                            </m:sSub>
+                          </m:oMath>
+                        </m:oMathPara>
+                      </a14:m>
+                      <a:endParaRPr lang="en-GB" sz="1600" b="1" dirty="0"/>
+                    </a:p>
+                  </p:txBody>
+                </p:sp>
+              </mc:Choice>
+              <mc:Fallback xmlns="">
+                <p:sp>
+                  <p:nvSpPr>
+                    <p:cNvPr id="5" name="Oval 4">
+                      <a:extLst>
+                        <a:ext uri="{FF2B5EF4-FFF2-40B4-BE49-F238E27FC236}">
+                          <a16:creationId xmlns:a16="http://schemas.microsoft.com/office/drawing/2014/main" id="{65C5272B-A118-4AB7-5B1F-E135FB8EF2F4}"/>
+                        </a:ext>
+                      </a:extLst>
+                    </p:cNvPr>
+                    <p:cNvSpPr>
+                      <a:spLocks noRot="1" noChangeAspect="1" noMove="1" noResize="1" noEditPoints="1" noAdjustHandles="1" noChangeArrowheads="1" noChangeShapeType="1" noTextEdit="1"/>
+                    </p:cNvSpPr>
+                    <p:nvPr/>
+                  </p:nvSpPr>
+                  <p:spPr>
+                    <a:xfrm rot="900645">
+                      <a:off x="2242496" y="2423835"/>
+                      <a:ext cx="1171180" cy="1738773"/>
+                    </a:xfrm>
+                    <a:prstGeom prst="ellipse">
+                      <a:avLst/>
+                    </a:prstGeom>
+                    <a:blipFill>
+                      <a:blip r:embed="rId2"/>
+                      <a:stretch>
+                        <a:fillRect/>
+                      </a:stretch>
+                    </a:blipFill>
+                    <a:ln>
+                      <a:noFill/>
+                    </a:ln>
+                  </p:spPr>
+                  <p:txBody>
+                    <a:bodyPr/>
+                    <a:lstStyle/>
+                    <a:p>
+                      <a:r>
+                        <a:rPr lang="en-IE">
+                          <a:noFill/>
+                        </a:rPr>
+                        <a:t> </a:t>
+                      </a:r>
+                    </a:p>
+                  </p:txBody>
+                </p:sp>
+              </mc:Fallback>
+            </mc:AlternateContent>
+            <mc:AlternateContent xmlns:mc="http://schemas.openxmlformats.org/markup-compatibility/2006" xmlns:a14="http://schemas.microsoft.com/office/drawing/2010/main">
+              <mc:Choice Requires="a14">
+                <p:sp>
+                  <p:nvSpPr>
+                    <p:cNvPr id="6" name="Oval 5">
+                      <a:extLst>
+                        <a:ext uri="{FF2B5EF4-FFF2-40B4-BE49-F238E27FC236}">
+                          <a16:creationId xmlns:a16="http://schemas.microsoft.com/office/drawing/2014/main" id="{C58557E8-AE07-E90D-4FF1-BFE8138053BD}"/>
+                        </a:ext>
+                      </a:extLst>
+                    </p:cNvPr>
+                    <p:cNvSpPr/>
+                    <p:nvPr/>
+                  </p:nvSpPr>
+                  <p:spPr>
+                    <a:xfrm>
+                      <a:off x="6719723" y="2770313"/>
+                      <a:ext cx="691344" cy="1150778"/>
+                    </a:xfrm>
+                    <a:prstGeom prst="ellipse">
+                      <a:avLst/>
+                    </a:prstGeom>
+                    <a:solidFill>
+                      <a:schemeClr val="tx2">
+                        <a:lumMod val="25000"/>
+                        <a:lumOff val="75000"/>
+                      </a:schemeClr>
+                    </a:solidFill>
+                    <a:ln>
+                      <a:noFill/>
+                    </a:ln>
+                  </p:spPr>
+                  <p:style>
+                    <a:lnRef idx="2">
+                      <a:schemeClr val="accent1">
+                        <a:shade val="15000"/>
+                      </a:schemeClr>
+                    </a:lnRef>
+                    <a:fillRef idx="1">
+                      <a:schemeClr val="accent1"/>
+                    </a:fillRef>
+                    <a:effectRef idx="0">
+                      <a:schemeClr val="accent1"/>
+                    </a:effectRef>
+                    <a:fontRef idx="minor">
+                      <a:schemeClr val="lt1"/>
+                    </a:fontRef>
+                  </p:style>
+                  <p:txBody>
+                    <a:bodyPr rtlCol="0" anchor="ctr"/>
+                    <a:lstStyle/>
+                    <a:p>
+                      <a:pPr algn="ctr"/>
+                      <a14:m>
+                        <m:oMathPara xmlns:m="http://schemas.openxmlformats.org/officeDocument/2006/math">
+                          <m:oMathParaPr>
+                            <m:jc m:val="centerGroup"/>
+                          </m:oMathParaPr>
+                          <m:oMath xmlns:m="http://schemas.openxmlformats.org/officeDocument/2006/math">
+                            <m:sSub>
+                              <m:sSubPr>
+                                <m:ctrlPr>
+                                  <a:rPr lang="en-GB" sz="1600" b="0" i="1" smtClean="0">
+                                    <a:latin typeface="Cambria Math" panose="02040503050406030204" pitchFamily="18" charset="0"/>
+                                  </a:rPr>
+                                </m:ctrlPr>
+                              </m:sSubPr>
+                              <m:e>
+                                <m:r>
+                                  <a:rPr lang="en-GB" sz="1600" b="0" i="1" smtClean="0">
+                                    <a:latin typeface="Cambria Math" panose="02040503050406030204" pitchFamily="18" charset="0"/>
+                                  </a:rPr>
+                                  <m:t>𝑀</m:t>
+                                </m:r>
+                              </m:e>
+                              <m:sub>
+                                <m:r>
+                                  <a:rPr lang="en-GB" sz="1600" b="0" i="1" smtClean="0">
+                                    <a:latin typeface="Cambria Math" panose="02040503050406030204" pitchFamily="18" charset="0"/>
+                                  </a:rPr>
+                                  <m:t>2</m:t>
+                                </m:r>
+                              </m:sub>
+                            </m:sSub>
+                          </m:oMath>
+                        </m:oMathPara>
+                      </a14:m>
+                      <a:endParaRPr lang="en-GB" sz="1600" b="0" dirty="0"/>
+                    </a:p>
+                  </p:txBody>
+                </p:sp>
+              </mc:Choice>
+              <mc:Fallback xmlns="">
+                <p:sp>
+                  <p:nvSpPr>
+                    <p:cNvPr id="6" name="Oval 5">
+                      <a:extLst>
+                        <a:ext uri="{FF2B5EF4-FFF2-40B4-BE49-F238E27FC236}">
+                          <a16:creationId xmlns:a16="http://schemas.microsoft.com/office/drawing/2014/main" id="{C58557E8-AE07-E90D-4FF1-BFE8138053BD}"/>
+                        </a:ext>
+                      </a:extLst>
+                    </p:cNvPr>
+                    <p:cNvSpPr>
+                      <a:spLocks noRot="1" noChangeAspect="1" noMove="1" noResize="1" noEditPoints="1" noAdjustHandles="1" noChangeArrowheads="1" noChangeShapeType="1" noTextEdit="1"/>
+                    </p:cNvSpPr>
+                    <p:nvPr/>
+                  </p:nvSpPr>
+                  <p:spPr>
+                    <a:xfrm>
+                      <a:off x="6719723" y="2770313"/>
+                      <a:ext cx="691344" cy="1150778"/>
+                    </a:xfrm>
+                    <a:prstGeom prst="ellipse">
+                      <a:avLst/>
+                    </a:prstGeom>
+                    <a:blipFill>
+                      <a:blip r:embed="rId3"/>
+                      <a:stretch>
+                        <a:fillRect l="-22449" b="-4255"/>
+                      </a:stretch>
+                    </a:blipFill>
+                    <a:ln>
+                      <a:noFill/>
+                    </a:ln>
+                  </p:spPr>
+                  <p:txBody>
+                    <a:bodyPr/>
+                    <a:lstStyle/>
+                    <a:p>
+                      <a:r>
+                        <a:rPr lang="en-IE">
+                          <a:noFill/>
+                        </a:rPr>
+                        <a:t> </a:t>
+                      </a:r>
+                    </a:p>
+                  </p:txBody>
+                </p:sp>
+              </mc:Fallback>
+            </mc:AlternateContent>
           </p:grpSp>
           <p:cxnSp>
             <p:nvCxnSpPr>
-              <p:cNvPr id="62" name="Straight Connector 61">
+              <p:cNvPr id="18" name="Straight Connector 17">
                 <a:extLst>
                   <a:ext uri="{FF2B5EF4-FFF2-40B4-BE49-F238E27FC236}">
-                    <a16:creationId xmlns:a16="http://schemas.microsoft.com/office/drawing/2014/main" id="{977C45D7-22BC-410C-F280-91EBCE2CF44F}"/>
+                    <a16:creationId xmlns:a16="http://schemas.microsoft.com/office/drawing/2014/main" id="{A53C79B1-AD74-211C-D76C-5D3C2E1D63ED}"/>
                   </a:ext>
                 </a:extLst>
               </p:cNvPr>
@@ -4580,18 +3903,16 @@
               <p:nvPr/>
             </p:nvCxnSpPr>
             <p:spPr>
-              <a:xfrm flipV="1">
-                <a:off x="4340055" y="2712165"/>
-                <a:ext cx="424968" cy="991111"/>
+              <a:xfrm flipH="1">
+                <a:off x="3378360" y="2441924"/>
+                <a:ext cx="151211" cy="434750"/>
               </a:xfrm>
               <a:prstGeom prst="line">
                 <a:avLst/>
               </a:prstGeom>
               <a:ln>
                 <a:solidFill>
-                  <a:schemeClr val="accent6">
-                    <a:lumMod val="75000"/>
-                  </a:schemeClr>
+                  <a:schemeClr val="tx1"/>
                 </a:solidFill>
               </a:ln>
             </p:spPr>
@@ -4612,10 +3933,10 @@
           </p:cxnSp>
           <p:sp>
             <p:nvSpPr>
-              <p:cNvPr id="63" name="Flowchart: Extract 62">
+              <p:cNvPr id="25" name="Flowchart: Extract 24">
                 <a:extLst>
                   <a:ext uri="{FF2B5EF4-FFF2-40B4-BE49-F238E27FC236}">
-                    <a16:creationId xmlns:a16="http://schemas.microsoft.com/office/drawing/2014/main" id="{428C6A4B-E51B-8D98-9717-9CEEA168652A}"/>
+                    <a16:creationId xmlns:a16="http://schemas.microsoft.com/office/drawing/2014/main" id="{9155E074-C6FE-CFA5-5198-32CB11C3C4F3}"/>
                   </a:ext>
                 </a:extLst>
               </p:cNvPr>
@@ -4623,25 +3944,16 @@
               <p:nvPr/>
             </p:nvSpPr>
             <p:spPr>
-              <a:xfrm rot="1694409">
-                <a:off x="4673151" y="2532092"/>
-                <a:ext cx="245454" cy="225994"/>
+              <a:xfrm rot="1416487">
+                <a:off x="3429764" y="2265048"/>
+                <a:ext cx="236247" cy="229180"/>
               </a:xfrm>
               <a:prstGeom prst="flowChartExtract">
                 <a:avLst/>
               </a:prstGeom>
               <a:solidFill>
-                <a:schemeClr val="accent6">
-                  <a:lumMod val="75000"/>
-                </a:schemeClr>
+                <a:schemeClr val="tx1"/>
               </a:solidFill>
-              <a:ln>
-                <a:solidFill>
-                  <a:schemeClr val="accent6">
-                    <a:lumMod val="75000"/>
-                  </a:schemeClr>
-                </a:solidFill>
-              </a:ln>
             </p:spPr>
             <p:style>
               <a:lnRef idx="2">
@@ -4664,18 +3976,18 @@
               <a:lstStyle/>
               <a:p>
                 <a:pPr algn="ctr"/>
-                <a:endParaRPr lang="en-IE"/>
+                <a:endParaRPr lang="en-IE" dirty="0"/>
               </a:p>
             </p:txBody>
           </p:sp>
-          <mc:AlternateContent xmlns:mc="http://schemas.openxmlformats.org/markup-compatibility/2006">
-            <mc:Choice xmlns:a14="http://schemas.microsoft.com/office/drawing/2010/main" Requires="a14">
+          <mc:AlternateContent xmlns:mc="http://schemas.openxmlformats.org/markup-compatibility/2006" xmlns:a14="http://schemas.microsoft.com/office/drawing/2010/main">
+            <mc:Choice Requires="a14">
               <p:sp>
                 <p:nvSpPr>
-                  <p:cNvPr id="64" name="TextBox 63">
+                  <p:cNvPr id="26" name="TextBox 25">
                     <a:extLst>
                       <a:ext uri="{FF2B5EF4-FFF2-40B4-BE49-F238E27FC236}">
-                        <a16:creationId xmlns:a16="http://schemas.microsoft.com/office/drawing/2014/main" id="{7F147F7A-8614-670F-2C82-D9D0F2E238D1}"/>
+                        <a16:creationId xmlns:a16="http://schemas.microsoft.com/office/drawing/2014/main" id="{5D321EF4-B798-22C3-D34E-FA0B1D7FCCF5}"/>
                       </a:ext>
                     </a:extLst>
                   </p:cNvPr>
@@ -4684,8 +3996,215 @@
                 </p:nvSpPr>
                 <p:spPr>
                   <a:xfrm>
-                    <a:off x="4834832" y="2467010"/>
-                    <a:ext cx="445219" cy="373052"/>
+                    <a:off x="5625449" y="2078222"/>
+                    <a:ext cx="436955" cy="613088"/>
+                  </a:xfrm>
+                  <a:prstGeom prst="rect">
+                    <a:avLst/>
+                  </a:prstGeom>
+                  <a:noFill/>
+                </p:spPr>
+                <p:txBody>
+                  <a:bodyPr wrap="square" rtlCol="0">
+                    <a:spAutoFit/>
+                  </a:bodyPr>
+                  <a:lstStyle/>
+                  <a:p>
+                    <a:pPr/>
+                    <a14:m>
+                      <m:oMathPara xmlns:m="http://schemas.openxmlformats.org/officeDocument/2006/math">
+                        <m:oMathParaPr>
+                          <m:jc m:val="centerGroup"/>
+                        </m:oMathParaPr>
+                        <m:oMath xmlns:m="http://schemas.openxmlformats.org/officeDocument/2006/math">
+                          <m:sSub>
+                            <m:sSubPr>
+                              <m:ctrlPr>
+                                <a:rPr lang="en-IE" sz="1200" b="1" i="1" smtClean="0">
+                                  <a:latin typeface="Cambria Math" panose="02040503050406030204" pitchFamily="18" charset="0"/>
+                                </a:rPr>
+                              </m:ctrlPr>
+                            </m:sSubPr>
+                            <m:e>
+                              <m:r>
+                                <a:rPr lang="en-IE" sz="1200" b="1" i="1" smtClean="0">
+                                  <a:latin typeface="Cambria Math" panose="02040503050406030204" pitchFamily="18" charset="0"/>
+                                </a:rPr>
+                                <m:t>𝑺</m:t>
+                              </m:r>
+                            </m:e>
+                            <m:sub>
+                              <m:r>
+                                <a:rPr lang="en-IE" sz="1200" b="1" i="1" smtClean="0">
+                                  <a:latin typeface="Cambria Math" panose="02040503050406030204" pitchFamily="18" charset="0"/>
+                                </a:rPr>
+                                <m:t>𝟐</m:t>
+                              </m:r>
+                            </m:sub>
+                          </m:sSub>
+                        </m:oMath>
+                      </m:oMathPara>
+                    </a14:m>
+                    <a:endParaRPr lang="en-IE" sz="1200" b="1" dirty="0"/>
+                  </a:p>
+                </p:txBody>
+              </p:sp>
+            </mc:Choice>
+            <mc:Fallback xmlns="">
+              <p:sp>
+                <p:nvSpPr>
+                  <p:cNvPr id="26" name="TextBox 25">
+                    <a:extLst>
+                      <a:ext uri="{FF2B5EF4-FFF2-40B4-BE49-F238E27FC236}">
+                        <a16:creationId xmlns:a16="http://schemas.microsoft.com/office/drawing/2014/main" id="{5D321EF4-B798-22C3-D34E-FA0B1D7FCCF5}"/>
+                      </a:ext>
+                    </a:extLst>
+                  </p:cNvPr>
+                  <p:cNvSpPr txBox="1">
+                    <a:spLocks noRot="1" noChangeAspect="1" noMove="1" noResize="1" noEditPoints="1" noAdjustHandles="1" noChangeArrowheads="1" noChangeShapeType="1" noTextEdit="1"/>
+                  </p:cNvSpPr>
+                  <p:nvPr/>
+                </p:nvSpPr>
+                <p:spPr>
+                  <a:xfrm>
+                    <a:off x="5625449" y="2078222"/>
+                    <a:ext cx="436955" cy="613088"/>
+                  </a:xfrm>
+                  <a:prstGeom prst="rect">
+                    <a:avLst/>
+                  </a:prstGeom>
+                  <a:blipFill>
+                    <a:blip r:embed="rId4"/>
+                    <a:stretch>
+                      <a:fillRect/>
+                    </a:stretch>
+                  </a:blipFill>
+                </p:spPr>
+                <p:txBody>
+                  <a:bodyPr/>
+                  <a:lstStyle/>
+                  <a:p>
+                    <a:r>
+                      <a:rPr lang="en-IE">
+                        <a:noFill/>
+                      </a:rPr>
+                      <a:t> </a:t>
+                    </a:r>
+                  </a:p>
+                </p:txBody>
+              </p:sp>
+            </mc:Fallback>
+          </mc:AlternateContent>
+          <p:cxnSp>
+            <p:nvCxnSpPr>
+              <p:cNvPr id="28" name="Straight Connector 27">
+                <a:extLst>
+                  <a:ext uri="{FF2B5EF4-FFF2-40B4-BE49-F238E27FC236}">
+                    <a16:creationId xmlns:a16="http://schemas.microsoft.com/office/drawing/2014/main" id="{2080E814-9D4D-0EC5-5742-6E2C29099F44}"/>
+                  </a:ext>
+                </a:extLst>
+              </p:cNvPr>
+              <p:cNvCxnSpPr>
+                <a:cxnSpLocks/>
+              </p:cNvCxnSpPr>
+              <p:nvPr/>
+            </p:nvCxnSpPr>
+            <p:spPr>
+              <a:xfrm flipH="1" flipV="1">
+                <a:off x="5550485" y="2421670"/>
+                <a:ext cx="199550" cy="602851"/>
+              </a:xfrm>
+              <a:prstGeom prst="line">
+                <a:avLst/>
+              </a:prstGeom>
+              <a:ln>
+                <a:solidFill>
+                  <a:schemeClr val="tx1"/>
+                </a:solidFill>
+              </a:ln>
+            </p:spPr>
+            <p:style>
+              <a:lnRef idx="2">
+                <a:schemeClr val="accent1"/>
+              </a:lnRef>
+              <a:fillRef idx="0">
+                <a:schemeClr val="accent1"/>
+              </a:fillRef>
+              <a:effectRef idx="1">
+                <a:schemeClr val="accent1"/>
+              </a:effectRef>
+              <a:fontRef idx="minor">
+                <a:schemeClr val="tx1"/>
+              </a:fontRef>
+            </p:style>
+          </p:cxnSp>
+          <p:sp>
+            <p:nvSpPr>
+              <p:cNvPr id="29" name="Flowchart: Extract 28">
+                <a:extLst>
+                  <a:ext uri="{FF2B5EF4-FFF2-40B4-BE49-F238E27FC236}">
+                    <a16:creationId xmlns:a16="http://schemas.microsoft.com/office/drawing/2014/main" id="{9B2A9400-A704-2D26-327F-02D244307D0B}"/>
+                  </a:ext>
+                </a:extLst>
+              </p:cNvPr>
+              <p:cNvSpPr/>
+              <p:nvPr/>
+            </p:nvSpPr>
+            <p:spPr>
+              <a:xfrm rot="20155868">
+                <a:off x="5425260" y="2269187"/>
+                <a:ext cx="218468" cy="229545"/>
+              </a:xfrm>
+              <a:prstGeom prst="flowChartExtract">
+                <a:avLst/>
+              </a:prstGeom>
+              <a:solidFill>
+                <a:schemeClr val="tx1"/>
+              </a:solidFill>
+            </p:spPr>
+            <p:style>
+              <a:lnRef idx="2">
+                <a:schemeClr val="accent1">
+                  <a:shade val="15000"/>
+                </a:schemeClr>
+              </a:lnRef>
+              <a:fillRef idx="1">
+                <a:schemeClr val="accent1"/>
+              </a:fillRef>
+              <a:effectRef idx="0">
+                <a:schemeClr val="accent1"/>
+              </a:effectRef>
+              <a:fontRef idx="minor">
+                <a:schemeClr val="lt1"/>
+              </a:fontRef>
+            </p:style>
+            <p:txBody>
+              <a:bodyPr rtlCol="0" anchor="ctr"/>
+              <a:lstStyle/>
+              <a:p>
+                <a:pPr algn="ctr"/>
+                <a:endParaRPr lang="en-IE" dirty="0"/>
+              </a:p>
+            </p:txBody>
+          </p:sp>
+          <mc:AlternateContent xmlns:mc="http://schemas.openxmlformats.org/markup-compatibility/2006" xmlns:a14="http://schemas.microsoft.com/office/drawing/2010/main">
+            <mc:Choice Requires="a14">
+              <p:sp>
+                <p:nvSpPr>
+                  <p:cNvPr id="30" name="TextBox 29">
+                    <a:extLst>
+                      <a:ext uri="{FF2B5EF4-FFF2-40B4-BE49-F238E27FC236}">
+                        <a16:creationId xmlns:a16="http://schemas.microsoft.com/office/drawing/2014/main" id="{6FE28D49-6B54-4D06-14E4-7188FB3FAFAC}"/>
+                      </a:ext>
+                    </a:extLst>
+                  </p:cNvPr>
+                  <p:cNvSpPr txBox="1"/>
+                  <p:nvPr/>
+                </p:nvSpPr>
+                <p:spPr>
+                  <a:xfrm>
+                    <a:off x="3014563" y="1808582"/>
+                    <a:ext cx="436955" cy="613088"/>
                   </a:xfrm>
                   <a:prstGeom prst="rect">
                     <a:avLst/>
@@ -4735,7 +4254,7 @@
                                   <a:ea typeface="Aptos" panose="020B0004020202020204" pitchFamily="34" charset="0"/>
                                   <a:cs typeface="Times New Roman" panose="02020603050405020304" pitchFamily="18" charset="0"/>
                                 </a:rPr>
-                                <m:t>𝒕𝒐𝒕𝒂𝒍</m:t>
+                                <m:t>𝟏</m:t>
                               </m:r>
                             </m:sub>
                           </m:sSub>
@@ -4752,13 +4271,13 @@
                 </p:txBody>
               </p:sp>
             </mc:Choice>
-            <mc:Fallback>
+            <mc:Fallback xmlns="">
               <p:sp>
                 <p:nvSpPr>
-                  <p:cNvPr id="64" name="TextBox 63">
+                  <p:cNvPr id="30" name="TextBox 29">
                     <a:extLst>
                       <a:ext uri="{FF2B5EF4-FFF2-40B4-BE49-F238E27FC236}">
-                        <a16:creationId xmlns:a16="http://schemas.microsoft.com/office/drawing/2014/main" id="{7F147F7A-8614-670F-2C82-D9D0F2E238D1}"/>
+                        <a16:creationId xmlns:a16="http://schemas.microsoft.com/office/drawing/2014/main" id="{6FE28D49-6B54-4D06-14E4-7188FB3FAFAC}"/>
                       </a:ext>
                     </a:extLst>
                   </p:cNvPr>
@@ -4769,16 +4288,16 @@
                 </p:nvSpPr>
                 <p:spPr>
                   <a:xfrm>
-                    <a:off x="4834832" y="2467010"/>
-                    <a:ext cx="445219" cy="373052"/>
+                    <a:off x="3014563" y="1808582"/>
+                    <a:ext cx="436955" cy="613088"/>
                   </a:xfrm>
                   <a:prstGeom prst="rect">
                     <a:avLst/>
                   </a:prstGeom>
                   <a:blipFill>
-                    <a:blip r:embed="rId6"/>
+                    <a:blip r:embed="rId5"/>
                     <a:stretch>
-                      <a:fillRect r="-29032"/>
+                      <a:fillRect/>
                     </a:stretch>
                   </a:blipFill>
                 </p:spPr>
@@ -4797,15 +4316,297 @@
               </p:sp>
             </mc:Fallback>
           </mc:AlternateContent>
+          <p:sp>
+            <p:nvSpPr>
+              <p:cNvPr id="31" name="Oval 30">
+                <a:extLst>
+                  <a:ext uri="{FF2B5EF4-FFF2-40B4-BE49-F238E27FC236}">
+                    <a16:creationId xmlns:a16="http://schemas.microsoft.com/office/drawing/2014/main" id="{2705B5D3-956B-5F3A-DD6B-5C324F06DAE7}"/>
+                  </a:ext>
+                </a:extLst>
+              </p:cNvPr>
+              <p:cNvSpPr/>
+              <p:nvPr/>
+            </p:nvSpPr>
+            <p:spPr>
+              <a:xfrm>
+                <a:off x="4506426" y="3242076"/>
+                <a:ext cx="232953" cy="285056"/>
+              </a:xfrm>
+              <a:prstGeom prst="ellipse">
+                <a:avLst/>
+              </a:prstGeom>
+              <a:solidFill>
+                <a:schemeClr val="tx1"/>
+              </a:solidFill>
+            </p:spPr>
+            <p:style>
+              <a:lnRef idx="2">
+                <a:schemeClr val="accent1">
+                  <a:shade val="15000"/>
+                </a:schemeClr>
+              </a:lnRef>
+              <a:fillRef idx="1">
+                <a:schemeClr val="accent1"/>
+              </a:fillRef>
+              <a:effectRef idx="0">
+                <a:schemeClr val="accent1"/>
+              </a:effectRef>
+              <a:fontRef idx="minor">
+                <a:schemeClr val="lt1"/>
+              </a:fontRef>
+            </p:style>
+            <p:txBody>
+              <a:bodyPr rtlCol="0" anchor="ctr"/>
+              <a:lstStyle/>
+              <a:p>
+                <a:pPr algn="ctr"/>
+                <a:endParaRPr lang="en-IE" dirty="0"/>
+              </a:p>
+            </p:txBody>
+          </p:sp>
+          <p:cxnSp>
+            <p:nvCxnSpPr>
+              <p:cNvPr id="33" name="Straight Connector 32">
+                <a:extLst>
+                  <a:ext uri="{FF2B5EF4-FFF2-40B4-BE49-F238E27FC236}">
+                    <a16:creationId xmlns:a16="http://schemas.microsoft.com/office/drawing/2014/main" id="{1C69F2E3-3F32-2A5F-8BDC-E032DAC60833}"/>
+                  </a:ext>
+                </a:extLst>
+              </p:cNvPr>
+              <p:cNvCxnSpPr>
+                <a:cxnSpLocks/>
+              </p:cNvCxnSpPr>
+              <p:nvPr/>
+            </p:nvCxnSpPr>
+            <p:spPr>
+              <a:xfrm flipV="1">
+                <a:off x="4646309" y="1352151"/>
+                <a:ext cx="7347" cy="1986246"/>
+              </a:xfrm>
+              <a:prstGeom prst="line">
+                <a:avLst/>
+              </a:prstGeom>
+              <a:ln>
+                <a:solidFill>
+                  <a:schemeClr val="tx1"/>
+                </a:solidFill>
+              </a:ln>
+            </p:spPr>
+            <p:style>
+              <a:lnRef idx="2">
+                <a:schemeClr val="accent1"/>
+              </a:lnRef>
+              <a:fillRef idx="0">
+                <a:schemeClr val="accent1"/>
+              </a:fillRef>
+              <a:effectRef idx="1">
+                <a:schemeClr val="accent1"/>
+              </a:effectRef>
+              <a:fontRef idx="minor">
+                <a:schemeClr val="tx1"/>
+              </a:fontRef>
+            </p:style>
+          </p:cxnSp>
+          <p:sp>
+            <p:nvSpPr>
+              <p:cNvPr id="34" name="TextBox 33">
+                <a:extLst>
+                  <a:ext uri="{FF2B5EF4-FFF2-40B4-BE49-F238E27FC236}">
+                    <a16:creationId xmlns:a16="http://schemas.microsoft.com/office/drawing/2014/main" id="{73B6DB2D-BF8F-84D6-6F16-50A74AB53BFC}"/>
+                  </a:ext>
+                </a:extLst>
+              </p:cNvPr>
+              <p:cNvSpPr txBox="1"/>
+              <p:nvPr/>
+            </p:nvSpPr>
+            <p:spPr>
+              <a:xfrm>
+                <a:off x="4228974" y="1012231"/>
+                <a:ext cx="309476" cy="613088"/>
+              </a:xfrm>
+              <a:prstGeom prst="rect">
+                <a:avLst/>
+              </a:prstGeom>
+              <a:noFill/>
+            </p:spPr>
+            <p:txBody>
+              <a:bodyPr wrap="square" rtlCol="0">
+                <a:spAutoFit/>
+              </a:bodyPr>
+              <a:lstStyle/>
+              <a:p>
+                <a:r>
+                  <a:rPr lang="en-IE" sz="1200" b="1" i="1" kern="100" dirty="0">
+                    <a:latin typeface="Cambria Math" panose="02040503050406030204" pitchFamily="18" charset="0"/>
+                    <a:cs typeface="Times New Roman" panose="02020603050405020304" pitchFamily="18" charset="0"/>
+                  </a:rPr>
+                  <a:t>L</a:t>
+                </a:r>
+              </a:p>
+            </p:txBody>
+          </p:sp>
+          <p:sp>
+            <p:nvSpPr>
+              <p:cNvPr id="35" name="Flowchart: Extract 34">
+                <a:extLst>
+                  <a:ext uri="{FF2B5EF4-FFF2-40B4-BE49-F238E27FC236}">
+                    <a16:creationId xmlns:a16="http://schemas.microsoft.com/office/drawing/2014/main" id="{3254255B-259F-1A9E-F0B4-F6D1B4D71B47}"/>
+                  </a:ext>
+                </a:extLst>
+              </p:cNvPr>
+              <p:cNvSpPr/>
+              <p:nvPr/>
+            </p:nvSpPr>
+            <p:spPr>
+              <a:xfrm>
+                <a:off x="4551397" y="1113297"/>
+                <a:ext cx="217249" cy="255639"/>
+              </a:xfrm>
+              <a:prstGeom prst="flowChartExtract">
+                <a:avLst/>
+              </a:prstGeom>
+              <a:solidFill>
+                <a:schemeClr val="tx1"/>
+              </a:solidFill>
+            </p:spPr>
+            <p:style>
+              <a:lnRef idx="2">
+                <a:schemeClr val="accent1">
+                  <a:shade val="15000"/>
+                </a:schemeClr>
+              </a:lnRef>
+              <a:fillRef idx="1">
+                <a:schemeClr val="accent1"/>
+              </a:fillRef>
+              <a:effectRef idx="0">
+                <a:schemeClr val="accent1"/>
+              </a:effectRef>
+              <a:fontRef idx="minor">
+                <a:schemeClr val="lt1"/>
+              </a:fontRef>
+            </p:style>
+            <p:txBody>
+              <a:bodyPr rtlCol="0" anchor="ctr"/>
+              <a:lstStyle/>
+              <a:p>
+                <a:pPr algn="ctr"/>
+                <a:endParaRPr lang="en-IE"/>
+              </a:p>
+            </p:txBody>
+          </p:sp>
         </p:grpSp>
-        <mc:AlternateContent xmlns:mc="http://schemas.openxmlformats.org/markup-compatibility/2006">
-          <mc:Choice xmlns:a14="http://schemas.microsoft.com/office/drawing/2010/main" Requires="a14">
+        <p:cxnSp>
+          <p:nvCxnSpPr>
+            <p:cNvPr id="62" name="Straight Connector 61">
+              <a:extLst>
+                <a:ext uri="{FF2B5EF4-FFF2-40B4-BE49-F238E27FC236}">
+                  <a16:creationId xmlns:a16="http://schemas.microsoft.com/office/drawing/2014/main" id="{977C45D7-22BC-410C-F280-91EBCE2CF44F}"/>
+                </a:ext>
+              </a:extLst>
+            </p:cNvPr>
+            <p:cNvCxnSpPr>
+              <a:cxnSpLocks/>
+            </p:cNvCxnSpPr>
+            <p:nvPr/>
+          </p:nvCxnSpPr>
+          <p:spPr>
+            <a:xfrm flipV="1">
+              <a:off x="4340055" y="2712165"/>
+              <a:ext cx="424968" cy="991111"/>
+            </a:xfrm>
+            <a:prstGeom prst="line">
+              <a:avLst/>
+            </a:prstGeom>
+            <a:ln>
+              <a:solidFill>
+                <a:schemeClr val="accent6">
+                  <a:lumMod val="75000"/>
+                </a:schemeClr>
+              </a:solidFill>
+            </a:ln>
+          </p:spPr>
+          <p:style>
+            <a:lnRef idx="2">
+              <a:schemeClr val="accent1"/>
+            </a:lnRef>
+            <a:fillRef idx="0">
+              <a:schemeClr val="accent1"/>
+            </a:fillRef>
+            <a:effectRef idx="1">
+              <a:schemeClr val="accent1"/>
+            </a:effectRef>
+            <a:fontRef idx="minor">
+              <a:schemeClr val="tx1"/>
+            </a:fontRef>
+          </p:style>
+        </p:cxnSp>
+        <p:sp>
+          <p:nvSpPr>
+            <p:cNvPr id="63" name="Flowchart: Extract 62">
+              <a:extLst>
+                <a:ext uri="{FF2B5EF4-FFF2-40B4-BE49-F238E27FC236}">
+                  <a16:creationId xmlns:a16="http://schemas.microsoft.com/office/drawing/2014/main" id="{428C6A4B-E51B-8D98-9717-9CEEA168652A}"/>
+                </a:ext>
+              </a:extLst>
+            </p:cNvPr>
+            <p:cNvSpPr/>
+            <p:nvPr/>
+          </p:nvSpPr>
+          <p:spPr>
+            <a:xfrm rot="1694409">
+              <a:off x="4673151" y="2532092"/>
+              <a:ext cx="245454" cy="225994"/>
+            </a:xfrm>
+            <a:prstGeom prst="flowChartExtract">
+              <a:avLst/>
+            </a:prstGeom>
+            <a:solidFill>
+              <a:schemeClr val="accent6">
+                <a:lumMod val="75000"/>
+              </a:schemeClr>
+            </a:solidFill>
+            <a:ln>
+              <a:solidFill>
+                <a:schemeClr val="accent6">
+                  <a:lumMod val="75000"/>
+                </a:schemeClr>
+              </a:solidFill>
+            </a:ln>
+          </p:spPr>
+          <p:style>
+            <a:lnRef idx="2">
+              <a:schemeClr val="accent1">
+                <a:shade val="15000"/>
+              </a:schemeClr>
+            </a:lnRef>
+            <a:fillRef idx="1">
+              <a:schemeClr val="accent1"/>
+            </a:fillRef>
+            <a:effectRef idx="0">
+              <a:schemeClr val="accent1"/>
+            </a:effectRef>
+            <a:fontRef idx="minor">
+              <a:schemeClr val="lt1"/>
+            </a:fontRef>
+          </p:style>
+          <p:txBody>
+            <a:bodyPr rtlCol="0" anchor="ctr"/>
+            <a:lstStyle/>
+            <a:p>
+              <a:pPr algn="ctr"/>
+              <a:endParaRPr lang="en-IE"/>
+            </a:p>
+          </p:txBody>
+        </p:sp>
+        <mc:AlternateContent xmlns:mc="http://schemas.openxmlformats.org/markup-compatibility/2006" xmlns:a14="http://schemas.microsoft.com/office/drawing/2010/main">
+          <mc:Choice Requires="a14">
             <p:sp>
               <p:nvSpPr>
-                <p:cNvPr id="69" name="TextBox 68">
+                <p:cNvPr id="64" name="TextBox 63">
                   <a:extLst>
                     <a:ext uri="{FF2B5EF4-FFF2-40B4-BE49-F238E27FC236}">
-                      <a16:creationId xmlns:a16="http://schemas.microsoft.com/office/drawing/2014/main" id="{2410340F-2145-3D8D-0FD6-79751048E90F}"/>
+                      <a16:creationId xmlns:a16="http://schemas.microsoft.com/office/drawing/2014/main" id="{7F147F7A-8614-670F-2C82-D9D0F2E238D1}"/>
                     </a:ext>
                   </a:extLst>
                 </p:cNvPr>
@@ -4814,8 +4615,8 @@
               </p:nvSpPr>
               <p:spPr>
                 <a:xfrm>
-                  <a:off x="5999156" y="2418090"/>
-                  <a:ext cx="2391711" cy="1808786"/>
+                  <a:off x="4834832" y="2467010"/>
+                  <a:ext cx="445219" cy="373052"/>
                 </a:xfrm>
                 <a:prstGeom prst="rect">
                   <a:avLst/>
@@ -4828,500 +4629,67 @@
                 </a:bodyPr>
                 <a:lstStyle/>
                 <a:p>
-                  <a:pPr marL="228600" indent="-228600">
-                    <a:buFont typeface="+mj-lt"/>
-                    <a:buAutoNum type="arabicPeriod"/>
-                  </a:pPr>
+                  <a:pPr/>
                   <a14:m>
-                    <m:oMath xmlns:m="http://schemas.openxmlformats.org/officeDocument/2006/math">
-                      <m:sSub>
-                        <m:sSubPr>
-                          <m:ctrlPr>
-                            <a:rPr lang="en-IE" sz="1200" b="1" i="1" kern="100" smtClean="0">
-                              <a:latin typeface="Cambria Math" panose="02040503050406030204" pitchFamily="18" charset="0"/>
-                              <a:ea typeface="Aptos" panose="020B0004020202020204" pitchFamily="34" charset="0"/>
-                              <a:cs typeface="Times New Roman" panose="02020603050405020304" pitchFamily="18" charset="0"/>
-                            </a:rPr>
-                          </m:ctrlPr>
-                        </m:sSubPr>
-                        <m:e>
-                          <m:r>
-                            <a:rPr lang="en-IE" sz="1200" b="1" i="1" kern="100">
-                              <a:latin typeface="Cambria Math" panose="02040503050406030204" pitchFamily="18" charset="0"/>
-                              <a:ea typeface="Aptos" panose="020B0004020202020204" pitchFamily="34" charset="0"/>
-                              <a:cs typeface="Times New Roman" panose="02020603050405020304" pitchFamily="18" charset="0"/>
-                            </a:rPr>
-                            <m:t>𝑺</m:t>
-                          </m:r>
-                        </m:e>
-                        <m:sub>
-                          <m:r>
-                            <a:rPr lang="en-IE" sz="1200" b="1" i="1" kern="100">
-                              <a:latin typeface="Cambria Math" panose="02040503050406030204" pitchFamily="18" charset="0"/>
-                              <a:ea typeface="Aptos" panose="020B0004020202020204" pitchFamily="34" charset="0"/>
-                              <a:cs typeface="Times New Roman" panose="02020603050405020304" pitchFamily="18" charset="0"/>
-                            </a:rPr>
-                            <m:t>𝒕𝒐𝒕𝒂𝒍</m:t>
-                          </m:r>
-                        </m:sub>
-                      </m:sSub>
-                      <m:r>
-                        <a:rPr lang="en-IE" sz="1200" i="1" kern="100">
-                          <a:effectLst/>
-                          <a:latin typeface="Cambria Math" panose="02040503050406030204" pitchFamily="18" charset="0"/>
-                          <a:ea typeface="Times New Roman" panose="02020603050405020304" pitchFamily="18" charset="0"/>
-                          <a:cs typeface="Times New Roman" panose="02020603050405020304" pitchFamily="18" charset="0"/>
-                        </a:rPr>
-                        <m:t>=</m:t>
-                      </m:r>
-                      <m:sSub>
-                        <m:sSubPr>
-                          <m:ctrlPr>
-                            <a:rPr lang="en-IE" sz="1200" b="1" i="1" kern="100" smtClean="0">
-                              <a:effectLst/>
-                              <a:latin typeface="Cambria Math" panose="02040503050406030204" pitchFamily="18" charset="0"/>
-                              <a:ea typeface="Times New Roman" panose="02020603050405020304" pitchFamily="18" charset="0"/>
-                              <a:cs typeface="Times New Roman" panose="02020603050405020304" pitchFamily="18" charset="0"/>
-                            </a:rPr>
-                          </m:ctrlPr>
-                        </m:sSubPr>
-                        <m:e>
-                          <m:r>
-                            <a:rPr lang="en-IE" sz="1200" b="1" i="1" kern="100" smtClean="0">
-                              <a:effectLst/>
-                              <a:latin typeface="Cambria Math" panose="02040503050406030204" pitchFamily="18" charset="0"/>
-                              <a:ea typeface="Times New Roman" panose="02020603050405020304" pitchFamily="18" charset="0"/>
-                              <a:cs typeface="Times New Roman" panose="02020603050405020304" pitchFamily="18" charset="0"/>
-                            </a:rPr>
-                            <m:t>𝑺</m:t>
-                          </m:r>
-                        </m:e>
-                        <m:sub>
-                          <m:r>
-                            <a:rPr lang="en-IE" sz="1200" b="1" i="1" kern="100" smtClean="0">
-                              <a:effectLst/>
-                              <a:latin typeface="Cambria Math" panose="02040503050406030204" pitchFamily="18" charset="0"/>
-                              <a:ea typeface="Times New Roman" panose="02020603050405020304" pitchFamily="18" charset="0"/>
-                              <a:cs typeface="Times New Roman" panose="02020603050405020304" pitchFamily="18" charset="0"/>
-                            </a:rPr>
-                            <m:t>𝟏</m:t>
-                          </m:r>
-                        </m:sub>
-                      </m:sSub>
-                      <m:r>
-                        <a:rPr lang="en-IE" sz="1200" b="1" i="1" kern="100">
-                          <a:effectLst/>
-                          <a:latin typeface="Cambria Math" panose="02040503050406030204" pitchFamily="18" charset="0"/>
-                          <a:ea typeface="Times New Roman" panose="02020603050405020304" pitchFamily="18" charset="0"/>
-                          <a:cs typeface="Times New Roman" panose="02020603050405020304" pitchFamily="18" charset="0"/>
-                        </a:rPr>
-                        <m:t>+</m:t>
-                      </m:r>
-                      <m:sSub>
-                        <m:sSubPr>
-                          <m:ctrlPr>
-                            <a:rPr lang="en-IE" sz="1200" b="1" i="1" kern="100" smtClean="0">
-                              <a:effectLst/>
-                              <a:latin typeface="Cambria Math" panose="02040503050406030204" pitchFamily="18" charset="0"/>
-                              <a:ea typeface="Times New Roman" panose="02020603050405020304" pitchFamily="18" charset="0"/>
-                              <a:cs typeface="Times New Roman" panose="02020603050405020304" pitchFamily="18" charset="0"/>
-                            </a:rPr>
-                          </m:ctrlPr>
-                        </m:sSubPr>
-                        <m:e>
-                          <m:r>
-                            <a:rPr lang="en-IE" sz="1200" b="1" i="1" kern="100" smtClean="0">
-                              <a:effectLst/>
-                              <a:latin typeface="Cambria Math" panose="02040503050406030204" pitchFamily="18" charset="0"/>
-                              <a:ea typeface="Times New Roman" panose="02020603050405020304" pitchFamily="18" charset="0"/>
-                              <a:cs typeface="Times New Roman" panose="02020603050405020304" pitchFamily="18" charset="0"/>
-                            </a:rPr>
-                            <m:t>𝑺</m:t>
-                          </m:r>
-                        </m:e>
-                        <m:sub>
-                          <m:r>
-                            <a:rPr lang="en-IE" sz="1200" b="1" i="1" kern="100" smtClean="0">
-                              <a:effectLst/>
-                              <a:latin typeface="Cambria Math" panose="02040503050406030204" pitchFamily="18" charset="0"/>
-                              <a:ea typeface="Times New Roman" panose="02020603050405020304" pitchFamily="18" charset="0"/>
-                              <a:cs typeface="Times New Roman" panose="02020603050405020304" pitchFamily="18" charset="0"/>
-                            </a:rPr>
-                            <m:t>𝟐</m:t>
-                          </m:r>
-                        </m:sub>
-                      </m:sSub>
-                    </m:oMath>
+                    <m:oMathPara xmlns:m="http://schemas.openxmlformats.org/officeDocument/2006/math">
+                      <m:oMathParaPr>
+                        <m:jc m:val="centerGroup"/>
+                      </m:oMathParaPr>
+                      <m:oMath xmlns:m="http://schemas.openxmlformats.org/officeDocument/2006/math">
+                        <m:sSub>
+                          <m:sSubPr>
+                            <m:ctrlPr>
+                              <a:rPr lang="en-IE" sz="1200" b="1" i="1" kern="100" smtClean="0">
+                                <a:effectLst/>
+                                <a:latin typeface="Cambria Math" panose="02040503050406030204" pitchFamily="18" charset="0"/>
+                                <a:ea typeface="Aptos" panose="020B0004020202020204" pitchFamily="34" charset="0"/>
+                                <a:cs typeface="Times New Roman" panose="02020603050405020304" pitchFamily="18" charset="0"/>
+                              </a:rPr>
+                            </m:ctrlPr>
+                          </m:sSubPr>
+                          <m:e>
+                            <m:r>
+                              <a:rPr lang="en-IE" sz="1200" b="1" i="1" kern="100" smtClean="0">
+                                <a:effectLst/>
+                                <a:latin typeface="Cambria Math" panose="02040503050406030204" pitchFamily="18" charset="0"/>
+                                <a:ea typeface="Aptos" panose="020B0004020202020204" pitchFamily="34" charset="0"/>
+                                <a:cs typeface="Times New Roman" panose="02020603050405020304" pitchFamily="18" charset="0"/>
+                              </a:rPr>
+                              <m:t>𝑺</m:t>
+                            </m:r>
+                          </m:e>
+                          <m:sub>
+                            <m:r>
+                              <a:rPr lang="en-IE" sz="1200" b="1" i="1" kern="100" smtClean="0">
+                                <a:effectLst/>
+                                <a:latin typeface="Cambria Math" panose="02040503050406030204" pitchFamily="18" charset="0"/>
+                                <a:ea typeface="Aptos" panose="020B0004020202020204" pitchFamily="34" charset="0"/>
+                                <a:cs typeface="Times New Roman" panose="02020603050405020304" pitchFamily="18" charset="0"/>
+                              </a:rPr>
+                              <m:t>𝒕𝒐𝒕𝒂𝒍</m:t>
+                            </m:r>
+                          </m:sub>
+                        </m:sSub>
+                      </m:oMath>
+                    </m:oMathPara>
                   </a14:m>
                   <a:endParaRPr lang="en-IE" sz="1200" b="1" kern="100" dirty="0">
                     <a:effectLst/>
-                    <a:latin typeface="Rockwell" panose="02060603020205020403" pitchFamily="18" charset="0"/>
+                    <a:latin typeface="Aptos" panose="020B0004020202020204" pitchFamily="34" charset="0"/>
                     <a:ea typeface="Aptos" panose="020B0004020202020204" pitchFamily="34" charset="0"/>
                     <a:cs typeface="Times New Roman" panose="02020603050405020304" pitchFamily="18" charset="0"/>
-                  </a:endParaRPr>
-                </a:p>
-                <a:p>
-                  <a:pPr marL="228600" indent="-228600">
-                    <a:buFont typeface="+mj-lt"/>
-                    <a:buAutoNum type="arabicPeriod"/>
-                  </a:pPr>
-                  <a:r>
-                    <a:rPr lang="en-GB" sz="1200" b="1" i="1" kern="100" dirty="0">
-                      <a:latin typeface="Cambria Math" panose="02040503050406030204" pitchFamily="18" charset="0"/>
-                      <a:ea typeface="Aptos" panose="020B0004020202020204" pitchFamily="34" charset="0"/>
-                      <a:cs typeface="Times New Roman" panose="02020603050405020304" pitchFamily="18" charset="0"/>
-                    </a:rPr>
-                    <a:t>S </a:t>
-                  </a:r>
-                  <a14:m>
-                    <m:oMath xmlns:m="http://schemas.openxmlformats.org/officeDocument/2006/math">
-                      <m:r>
-                        <a:rPr lang="en-GB" sz="1200" b="0" i="1" kern="100" dirty="0">
-                          <a:latin typeface="Cambria Math" panose="02040503050406030204" pitchFamily="18" charset="0"/>
-                          <a:ea typeface="Aptos" panose="020B0004020202020204" pitchFamily="34" charset="0"/>
-                          <a:cs typeface="Times New Roman" panose="02020603050405020304" pitchFamily="18" charset="0"/>
-                        </a:rPr>
-                        <m:t>=</m:t>
-                      </m:r>
-                      <m:d>
-                        <m:dPr>
-                          <m:ctrlPr>
-                            <a:rPr lang="en-GB" sz="1200" i="1" kern="100">
-                              <a:latin typeface="Cambria Math" panose="02040503050406030204" pitchFamily="18" charset="0"/>
-                              <a:ea typeface="Aptos" panose="020B0004020202020204" pitchFamily="34" charset="0"/>
-                              <a:cs typeface="Times New Roman" panose="02020603050405020304" pitchFamily="18" charset="0"/>
-                            </a:rPr>
-                          </m:ctrlPr>
-                        </m:dPr>
-                        <m:e>
-                          <m:sSub>
-                            <m:sSubPr>
-                              <m:ctrlPr>
-                                <a:rPr lang="en-GB" sz="1200" i="1" kern="100">
-                                  <a:latin typeface="Cambria Math" panose="02040503050406030204" pitchFamily="18" charset="0"/>
-                                  <a:ea typeface="Aptos" panose="020B0004020202020204" pitchFamily="34" charset="0"/>
-                                  <a:cs typeface="Times New Roman" panose="02020603050405020304" pitchFamily="18" charset="0"/>
-                                </a:rPr>
-                              </m:ctrlPr>
-                            </m:sSubPr>
-                            <m:e>
-                              <m:r>
-                                <a:rPr lang="en-GB" sz="1200" b="0" i="1" kern="100">
-                                  <a:latin typeface="Cambria Math" panose="02040503050406030204" pitchFamily="18" charset="0"/>
-                                  <a:ea typeface="Aptos" panose="020B0004020202020204" pitchFamily="34" charset="0"/>
-                                  <a:cs typeface="Times New Roman" panose="02020603050405020304" pitchFamily="18" charset="0"/>
-                                </a:rPr>
-                                <m:t>𝑆</m:t>
-                              </m:r>
-                            </m:e>
-                            <m:sub>
-                              <m:r>
-                                <a:rPr lang="en-GB" sz="1200" b="0" i="1" kern="100">
-                                  <a:latin typeface="Cambria Math" panose="02040503050406030204" pitchFamily="18" charset="0"/>
-                                  <a:ea typeface="Aptos" panose="020B0004020202020204" pitchFamily="34" charset="0"/>
-                                  <a:cs typeface="Times New Roman" panose="02020603050405020304" pitchFamily="18" charset="0"/>
-                                </a:rPr>
-                                <m:t>𝑥</m:t>
-                              </m:r>
-                            </m:sub>
-                          </m:sSub>
-                          <m:r>
-                            <a:rPr lang="en-GB" sz="1200" b="0" i="1" kern="100">
-                              <a:latin typeface="Cambria Math" panose="02040503050406030204" pitchFamily="18" charset="0"/>
-                              <a:ea typeface="Aptos" panose="020B0004020202020204" pitchFamily="34" charset="0"/>
-                              <a:cs typeface="Times New Roman" panose="02020603050405020304" pitchFamily="18" charset="0"/>
-                            </a:rPr>
-                            <m:t>,</m:t>
-                          </m:r>
-                          <m:sSub>
-                            <m:sSubPr>
-                              <m:ctrlPr>
-                                <a:rPr lang="en-GB" sz="1200" i="1" kern="100">
-                                  <a:latin typeface="Cambria Math" panose="02040503050406030204" pitchFamily="18" charset="0"/>
-                                  <a:ea typeface="Aptos" panose="020B0004020202020204" pitchFamily="34" charset="0"/>
-                                  <a:cs typeface="Times New Roman" panose="02020603050405020304" pitchFamily="18" charset="0"/>
-                                </a:rPr>
-                              </m:ctrlPr>
-                            </m:sSubPr>
-                            <m:e>
-                              <m:r>
-                                <a:rPr lang="en-GB" sz="1200" b="0" i="1" kern="100">
-                                  <a:latin typeface="Cambria Math" panose="02040503050406030204" pitchFamily="18" charset="0"/>
-                                  <a:ea typeface="Aptos" panose="020B0004020202020204" pitchFamily="34" charset="0"/>
-                                  <a:cs typeface="Times New Roman" panose="02020603050405020304" pitchFamily="18" charset="0"/>
-                                </a:rPr>
-                                <m:t>𝑆</m:t>
-                              </m:r>
-                            </m:e>
-                            <m:sub>
-                              <m:r>
-                                <a:rPr lang="en-GB" sz="1200" b="0" i="1" kern="100">
-                                  <a:latin typeface="Cambria Math" panose="02040503050406030204" pitchFamily="18" charset="0"/>
-                                  <a:ea typeface="Aptos" panose="020B0004020202020204" pitchFamily="34" charset="0"/>
-                                  <a:cs typeface="Times New Roman" panose="02020603050405020304" pitchFamily="18" charset="0"/>
-                                </a:rPr>
-                                <m:t>𝑦</m:t>
-                              </m:r>
-                            </m:sub>
-                          </m:sSub>
-                          <m:r>
-                            <a:rPr lang="en-GB" sz="1200" b="0" i="1" kern="100">
-                              <a:latin typeface="Cambria Math" panose="02040503050406030204" pitchFamily="18" charset="0"/>
-                              <a:ea typeface="Aptos" panose="020B0004020202020204" pitchFamily="34" charset="0"/>
-                              <a:cs typeface="Times New Roman" panose="02020603050405020304" pitchFamily="18" charset="0"/>
-                            </a:rPr>
-                            <m:t>,</m:t>
-                          </m:r>
-                          <m:sSub>
-                            <m:sSubPr>
-                              <m:ctrlPr>
-                                <a:rPr lang="en-GB" sz="1200" i="1" kern="100">
-                                  <a:latin typeface="Cambria Math" panose="02040503050406030204" pitchFamily="18" charset="0"/>
-                                  <a:ea typeface="Aptos" panose="020B0004020202020204" pitchFamily="34" charset="0"/>
-                                  <a:cs typeface="Times New Roman" panose="02020603050405020304" pitchFamily="18" charset="0"/>
-                                </a:rPr>
-                              </m:ctrlPr>
-                            </m:sSubPr>
-                            <m:e>
-                              <m:r>
-                                <a:rPr lang="en-GB" sz="1200" b="0" i="1" kern="100">
-                                  <a:latin typeface="Cambria Math" panose="02040503050406030204" pitchFamily="18" charset="0"/>
-                                  <a:ea typeface="Aptos" panose="020B0004020202020204" pitchFamily="34" charset="0"/>
-                                  <a:cs typeface="Times New Roman" panose="02020603050405020304" pitchFamily="18" charset="0"/>
-                                </a:rPr>
-                                <m:t>𝑆</m:t>
-                              </m:r>
-                            </m:e>
-                            <m:sub>
-                              <m:r>
-                                <a:rPr lang="en-GB" sz="1200" b="0" i="1" kern="100">
-                                  <a:latin typeface="Cambria Math" panose="02040503050406030204" pitchFamily="18" charset="0"/>
-                                  <a:ea typeface="Aptos" panose="020B0004020202020204" pitchFamily="34" charset="0"/>
-                                  <a:cs typeface="Times New Roman" panose="02020603050405020304" pitchFamily="18" charset="0"/>
-                                </a:rPr>
-                                <m:t>𝑧</m:t>
-                              </m:r>
-                            </m:sub>
-                          </m:sSub>
-                        </m:e>
-                      </m:d>
-                    </m:oMath>
-                  </a14:m>
-                  <a:r>
-                    <a:rPr lang="en-IE" sz="1200" i="1" kern="100" dirty="0">
-                      <a:latin typeface="Cambria Math" panose="02040503050406030204" pitchFamily="18" charset="0"/>
-                      <a:ea typeface="Aptos" panose="020B0004020202020204" pitchFamily="34" charset="0"/>
-                      <a:cs typeface="Times New Roman" panose="02020603050405020304" pitchFamily="18" charset="0"/>
-                    </a:rPr>
-                    <a:t>:Spin Vectors</a:t>
-                  </a:r>
-                </a:p>
-                <a:p>
-                  <a:pPr marL="228600" indent="-228600">
-                    <a:buFont typeface="+mj-lt"/>
-                    <a:buAutoNum type="arabicPeriod"/>
-                  </a:pPr>
-                  <a:r>
-                    <a:rPr lang="en-IE" sz="1200" i="1" kern="100" dirty="0">
-                      <a:latin typeface="Cambria Math" panose="02040503050406030204" pitchFamily="18" charset="0"/>
-                      <a:cs typeface="Times New Roman" panose="02020603050405020304" pitchFamily="18" charset="0"/>
-                    </a:rPr>
-                    <a:t>M: Masses</a:t>
-                  </a:r>
-                </a:p>
-                <a:p>
-                  <a:pPr marL="228600" indent="-228600">
-                    <a:buFont typeface="+mj-lt"/>
-                    <a:buAutoNum type="arabicPeriod"/>
-                  </a:pPr>
-                  <a:r>
-                    <a:rPr lang="en-GB" sz="1200" b="1" i="1" kern="100" dirty="0">
-                      <a:latin typeface="Cambria Math" panose="02040503050406030204" pitchFamily="18" charset="0"/>
-                      <a:ea typeface="Aptos" panose="020B0004020202020204" pitchFamily="34" charset="0"/>
-                      <a:cs typeface="Times New Roman" panose="02020603050405020304" pitchFamily="18" charset="0"/>
-                    </a:rPr>
-                    <a:t>L</a:t>
-                  </a:r>
-                  <a14:m>
-                    <m:oMath xmlns:m="http://schemas.openxmlformats.org/officeDocument/2006/math">
-                      <m:r>
-                        <a:rPr lang="en-IE" sz="1200" b="1" i="1" kern="100" smtClean="0">
-                          <a:effectLst/>
-                          <a:latin typeface="Cambria Math" panose="02040503050406030204" pitchFamily="18" charset="0"/>
-                          <a:ea typeface="Times New Roman" panose="02020603050405020304" pitchFamily="18" charset="0"/>
-                          <a:cs typeface="Times New Roman" panose="02020603050405020304" pitchFamily="18" charset="0"/>
-                        </a:rPr>
-                        <m:t> </m:t>
-                      </m:r>
-                      <m:r>
-                        <a:rPr lang="en-GB" sz="1200" b="0" i="1" kern="100" smtClean="0">
-                          <a:effectLst/>
-                          <a:latin typeface="Cambria Math" panose="02040503050406030204" pitchFamily="18" charset="0"/>
-                          <a:ea typeface="Times New Roman" panose="02020603050405020304" pitchFamily="18" charset="0"/>
-                          <a:cs typeface="Times New Roman" panose="02020603050405020304" pitchFamily="18" charset="0"/>
-                        </a:rPr>
-                        <m:t>=</m:t>
-                      </m:r>
-                      <m:d>
-                        <m:dPr>
-                          <m:ctrlPr>
-                            <a:rPr lang="en-GB" sz="1200" b="0" i="1" kern="100" smtClean="0">
-                              <a:effectLst/>
-                              <a:latin typeface="Cambria Math" panose="02040503050406030204" pitchFamily="18" charset="0"/>
-                              <a:ea typeface="Times New Roman" panose="02020603050405020304" pitchFamily="18" charset="0"/>
-                              <a:cs typeface="Times New Roman" panose="02020603050405020304" pitchFamily="18" charset="0"/>
-                            </a:rPr>
-                          </m:ctrlPr>
-                        </m:dPr>
-                        <m:e>
-                          <m:sSub>
-                            <m:sSubPr>
-                              <m:ctrlPr>
-                                <a:rPr lang="en-GB" sz="1200" b="0" i="1" kern="100" smtClean="0">
-                                  <a:effectLst/>
-                                  <a:latin typeface="Cambria Math" panose="02040503050406030204" pitchFamily="18" charset="0"/>
-                                  <a:ea typeface="Times New Roman" panose="02020603050405020304" pitchFamily="18" charset="0"/>
-                                  <a:cs typeface="Times New Roman" panose="02020603050405020304" pitchFamily="18" charset="0"/>
-                                </a:rPr>
-                              </m:ctrlPr>
-                            </m:sSubPr>
-                            <m:e>
-                              <m:r>
-                                <a:rPr lang="en-GB" sz="1200" b="0" i="1" kern="100" smtClean="0">
-                                  <a:effectLst/>
-                                  <a:latin typeface="Cambria Math" panose="02040503050406030204" pitchFamily="18" charset="0"/>
-                                  <a:ea typeface="Times New Roman" panose="02020603050405020304" pitchFamily="18" charset="0"/>
-                                  <a:cs typeface="Times New Roman" panose="02020603050405020304" pitchFamily="18" charset="0"/>
-                                </a:rPr>
-                                <m:t>𝐿</m:t>
-                              </m:r>
-                            </m:e>
-                            <m:sub>
-                              <m:r>
-                                <a:rPr lang="en-GB" sz="1200" b="0" i="1" kern="100" smtClean="0">
-                                  <a:effectLst/>
-                                  <a:latin typeface="Cambria Math" panose="02040503050406030204" pitchFamily="18" charset="0"/>
-                                  <a:ea typeface="Times New Roman" panose="02020603050405020304" pitchFamily="18" charset="0"/>
-                                  <a:cs typeface="Times New Roman" panose="02020603050405020304" pitchFamily="18" charset="0"/>
-                                </a:rPr>
-                                <m:t>𝑥</m:t>
-                              </m:r>
-                            </m:sub>
-                          </m:sSub>
-                          <m:r>
-                            <a:rPr lang="en-GB" sz="1200" b="0" i="1" kern="100" smtClean="0">
-                              <a:effectLst/>
-                              <a:latin typeface="Cambria Math" panose="02040503050406030204" pitchFamily="18" charset="0"/>
-                              <a:ea typeface="Times New Roman" panose="02020603050405020304" pitchFamily="18" charset="0"/>
-                              <a:cs typeface="Times New Roman" panose="02020603050405020304" pitchFamily="18" charset="0"/>
-                            </a:rPr>
-                            <m:t>,</m:t>
-                          </m:r>
-                          <m:sSub>
-                            <m:sSubPr>
-                              <m:ctrlPr>
-                                <a:rPr lang="en-GB" sz="1200" b="0" i="1" kern="100" smtClean="0">
-                                  <a:effectLst/>
-                                  <a:latin typeface="Cambria Math" panose="02040503050406030204" pitchFamily="18" charset="0"/>
-                                  <a:ea typeface="Times New Roman" panose="02020603050405020304" pitchFamily="18" charset="0"/>
-                                  <a:cs typeface="Times New Roman" panose="02020603050405020304" pitchFamily="18" charset="0"/>
-                                </a:rPr>
-                              </m:ctrlPr>
-                            </m:sSubPr>
-                            <m:e>
-                              <m:r>
-                                <a:rPr lang="en-GB" sz="1200" b="0" i="1" kern="100" smtClean="0">
-                                  <a:effectLst/>
-                                  <a:latin typeface="Cambria Math" panose="02040503050406030204" pitchFamily="18" charset="0"/>
-                                  <a:ea typeface="Times New Roman" panose="02020603050405020304" pitchFamily="18" charset="0"/>
-                                  <a:cs typeface="Times New Roman" panose="02020603050405020304" pitchFamily="18" charset="0"/>
-                                </a:rPr>
-                                <m:t>𝐿</m:t>
-                              </m:r>
-                            </m:e>
-                            <m:sub>
-                              <m:r>
-                                <a:rPr lang="en-GB" sz="1200" b="0" i="1" kern="100" smtClean="0">
-                                  <a:effectLst/>
-                                  <a:latin typeface="Cambria Math" panose="02040503050406030204" pitchFamily="18" charset="0"/>
-                                  <a:ea typeface="Times New Roman" panose="02020603050405020304" pitchFamily="18" charset="0"/>
-                                  <a:cs typeface="Times New Roman" panose="02020603050405020304" pitchFamily="18" charset="0"/>
-                                </a:rPr>
-                                <m:t>𝑦</m:t>
-                              </m:r>
-                            </m:sub>
-                          </m:sSub>
-                          <m:r>
-                            <a:rPr lang="en-GB" sz="1200" b="0" i="1" kern="100" smtClean="0">
-                              <a:effectLst/>
-                              <a:latin typeface="Cambria Math" panose="02040503050406030204" pitchFamily="18" charset="0"/>
-                              <a:ea typeface="Times New Roman" panose="02020603050405020304" pitchFamily="18" charset="0"/>
-                              <a:cs typeface="Times New Roman" panose="02020603050405020304" pitchFamily="18" charset="0"/>
-                            </a:rPr>
-                            <m:t>,</m:t>
-                          </m:r>
-                          <m:sSub>
-                            <m:sSubPr>
-                              <m:ctrlPr>
-                                <a:rPr lang="en-GB" sz="1200" b="0" i="1" kern="100" smtClean="0">
-                                  <a:effectLst/>
-                                  <a:latin typeface="Cambria Math" panose="02040503050406030204" pitchFamily="18" charset="0"/>
-                                  <a:ea typeface="Times New Roman" panose="02020603050405020304" pitchFamily="18" charset="0"/>
-                                  <a:cs typeface="Times New Roman" panose="02020603050405020304" pitchFamily="18" charset="0"/>
-                                </a:rPr>
-                              </m:ctrlPr>
-                            </m:sSubPr>
-                            <m:e>
-                              <m:r>
-                                <a:rPr lang="en-GB" sz="1200" b="0" i="1" kern="100" smtClean="0">
-                                  <a:effectLst/>
-                                  <a:latin typeface="Cambria Math" panose="02040503050406030204" pitchFamily="18" charset="0"/>
-                                  <a:ea typeface="Times New Roman" panose="02020603050405020304" pitchFamily="18" charset="0"/>
-                                  <a:cs typeface="Times New Roman" panose="02020603050405020304" pitchFamily="18" charset="0"/>
-                                </a:rPr>
-                                <m:t>𝐿</m:t>
-                              </m:r>
-                            </m:e>
-                            <m:sub>
-                              <m:r>
-                                <a:rPr lang="en-GB" sz="1200" b="0" i="1" kern="100" smtClean="0">
-                                  <a:effectLst/>
-                                  <a:latin typeface="Cambria Math" panose="02040503050406030204" pitchFamily="18" charset="0"/>
-                                  <a:ea typeface="Times New Roman" panose="02020603050405020304" pitchFamily="18" charset="0"/>
-                                  <a:cs typeface="Times New Roman" panose="02020603050405020304" pitchFamily="18" charset="0"/>
-                                </a:rPr>
-                                <m:t>𝑧</m:t>
-                              </m:r>
-                            </m:sub>
-                          </m:sSub>
-                        </m:e>
-                      </m:d>
-                    </m:oMath>
-                  </a14:m>
-                  <a:r>
-                    <a:rPr lang="en-IE" sz="1200" i="1" kern="100" dirty="0">
-                      <a:latin typeface="Cambria Math" panose="02040503050406030204" pitchFamily="18" charset="0"/>
-                      <a:ea typeface="Aptos" panose="020B0004020202020204" pitchFamily="34" charset="0"/>
-                      <a:cs typeface="Times New Roman" panose="02020603050405020304" pitchFamily="18" charset="0"/>
-                    </a:rPr>
-                    <a:t>:Orbital angular momentum </a:t>
-                  </a:r>
-                </a:p>
-                <a:p>
-                  <a:endParaRPr lang="en-IE" sz="1200" dirty="0">
-                    <a:latin typeface="Rockwell" panose="02060603020205020403" pitchFamily="18" charset="0"/>
                   </a:endParaRPr>
                 </a:p>
               </p:txBody>
             </p:sp>
           </mc:Choice>
-          <mc:Fallback>
+          <mc:Fallback xmlns="">
             <p:sp>
               <p:nvSpPr>
-                <p:cNvPr id="69" name="TextBox 68">
+                <p:cNvPr id="64" name="TextBox 63">
                   <a:extLst>
                     <a:ext uri="{FF2B5EF4-FFF2-40B4-BE49-F238E27FC236}">
-                      <a16:creationId xmlns:a16="http://schemas.microsoft.com/office/drawing/2014/main" id="{2410340F-2145-3D8D-0FD6-79751048E90F}"/>
+                      <a16:creationId xmlns:a16="http://schemas.microsoft.com/office/drawing/2014/main" id="{7F147F7A-8614-670F-2C82-D9D0F2E238D1}"/>
                     </a:ext>
                   </a:extLst>
                 </p:cNvPr>
@@ -5332,16 +4700,16 @@
               </p:nvSpPr>
               <p:spPr>
                 <a:xfrm>
-                  <a:off x="5999156" y="2418090"/>
-                  <a:ext cx="2391711" cy="1808786"/>
+                  <a:off x="4834832" y="2467010"/>
+                  <a:ext cx="445219" cy="373052"/>
                 </a:xfrm>
                 <a:prstGeom prst="rect">
                   <a:avLst/>
                 </a:prstGeom>
                 <a:blipFill>
-                  <a:blip r:embed="rId7"/>
+                  <a:blip r:embed="rId6"/>
                   <a:stretch>
-                    <a:fillRect t="-424"/>
+                    <a:fillRect r="-29032"/>
                   </a:stretch>
                 </a:blipFill>
               </p:spPr>

</xml_diff>